<commit_message>
law of large & sampling slides
</commit_message>
<xml_diff>
--- a/spring13/slides13/birthday-matching.pptx
+++ b/spring13/slides13/birthday-matching.pptx
@@ -4415,7 +4415,7 @@
           <a:graphicData uri="http://schemas.openxmlformats.org/presentationml/2006/ole">
             <mc:AlternateContent xmlns:mc="http://schemas.openxmlformats.org/markup-compatibility/2006">
               <mc:Choice xmlns:v="urn:schemas-microsoft-com:vml" Requires="v">
-                <p:oleObj spid="_x0000_s586808" name="Equation" r:id="rId3" imgW="1003300" imgH="457200" progId="Equation.DSMT4">
+                <p:oleObj spid="_x0000_s586811" name="Equation" r:id="rId3" imgW="1003300" imgH="457200" progId="Equation.DSMT4">
                   <p:embed/>
                 </p:oleObj>
               </mc:Choice>
@@ -4659,7 +4659,7 @@
               <a:t> </a:t>
             </a:r>
             <a:r>
-              <a:rPr lang="en-US" altLang="zh-CN" sz="4000" dirty="0" err="1">
+              <a:rPr lang="en-US" altLang="zh-CN" sz="4000" dirty="0" err="1" smtClean="0">
                 <a:ea typeface="SimSun" pitchFamily="2" charset="-122"/>
                 <a:cs typeface="SimSun" pitchFamily="2" charset="-122"/>
               </a:rPr>
@@ -4670,7 +4670,7 @@
                 <a:ea typeface="SimSun" pitchFamily="2" charset="-122"/>
                 <a:cs typeface="SimSun" pitchFamily="2" charset="-122"/>
               </a:rPr>
-              <a:t>{</a:t>
+              <a:t>[</a:t>
             </a:r>
             <a:r>
               <a:rPr lang="en-US" altLang="zh-CN" sz="4000" dirty="0" smtClean="0">
@@ -4732,11 +4732,11 @@
               <a:t> </a:t>
             </a:r>
             <a:r>
-              <a:rPr lang="en-US" sz="4000" dirty="0"/>
-              <a:t>pairs} </a:t>
-            </a:r>
-            <a:r>
-              <a:rPr lang="en-US" sz="4000" dirty="0">
+              <a:rPr lang="en-US" sz="4000" dirty="0" smtClean="0"/>
+              <a:t>pairs] </a:t>
+            </a:r>
+            <a:r>
+              <a:rPr lang="en-US" sz="4000" dirty="0" smtClean="0">
                 <a:latin typeface="Times New Roman" charset="0"/>
               </a:rPr>
               <a:t> </a:t>
@@ -6048,7 +6048,7 @@
           <a:graphicData uri="http://schemas.openxmlformats.org/presentationml/2006/ole">
             <mc:AlternateContent xmlns:mc="http://schemas.openxmlformats.org/markup-compatibility/2006">
               <mc:Choice xmlns:v="urn:schemas-microsoft-com:vml" Requires="v">
-                <p:oleObj spid="_x0000_s578622" name="Equation" r:id="rId6" imgW="762000" imgH="381000" progId="Equation.DSMT4">
+                <p:oleObj spid="_x0000_s578625" name="Equation" r:id="rId6" imgW="762000" imgH="381000" progId="Equation.DSMT4">
                   <p:embed/>
                 </p:oleObj>
               </mc:Choice>
@@ -6557,7 +6557,7 @@
         </p:nvSpPr>
         <p:spPr>
           <a:xfrm>
-            <a:off x="914400" y="2603500"/>
+            <a:off x="965200" y="2603500"/>
             <a:ext cx="7099300" cy="1168400"/>
           </a:xfrm>
         </p:spPr>
@@ -6589,25 +6589,25 @@
             <p:ph sz="half" idx="2"/>
             <p:extLst>
               <p:ext uri="{D42A27DB-BD31-4B8C-83A1-F6EECF244321}">
-                <p14:modId xmlns:p14="http://schemas.microsoft.com/office/powerpoint/2010/main" val="3147807441"/>
+                <p14:modId xmlns:p14="http://schemas.microsoft.com/office/powerpoint/2010/main" val="3467089918"/>
               </p:ext>
             </p:extLst>
           </p:nvPr>
         </p:nvGraphicFramePr>
         <p:xfrm>
-          <a:off x="776288" y="3621088"/>
-          <a:ext cx="7380287" cy="1989137"/>
+          <a:off x="930275" y="3621088"/>
+          <a:ext cx="7223125" cy="1989137"/>
         </p:xfrm>
         <a:graphic>
           <a:graphicData uri="http://schemas.openxmlformats.org/presentationml/2006/ole">
             <mc:AlternateContent xmlns:mc="http://schemas.openxmlformats.org/markup-compatibility/2006">
               <mc:Choice xmlns:v="urn:schemas-microsoft-com:vml" Requires="v">
-                <p:oleObj spid="_x0000_s580666" name="Equation" r:id="rId5" imgW="1790700" imgH="482600" progId="Equation.DSMT4">
+                <p:oleObj spid="_x0000_s580669" name="Equation" r:id="rId5" imgW="1752600" imgH="482600" progId="Equation.DSMT4">
                   <p:embed/>
                 </p:oleObj>
               </mc:Choice>
               <mc:Fallback>
-                <p:oleObj name="Equation" r:id="rId5" imgW="1790700" imgH="482600" progId="Equation.DSMT4">
+                <p:oleObj name="Equation" r:id="rId5" imgW="1752600" imgH="482600" progId="Equation.DSMT4">
                   <p:embed/>
                   <p:pic>
                     <p:nvPicPr>
@@ -6626,8 +6626,8 @@
                     </p:blipFill>
                     <p:spPr bwMode="auto">
                       <a:xfrm>
-                        <a:off x="776288" y="3621088"/>
-                        <a:ext cx="7380287" cy="1989137"/>
+                        <a:off x="930275" y="3621088"/>
+                        <a:ext cx="7223125" cy="1989137"/>
                       </a:xfrm>
                       <a:prstGeom prst="rect">
                         <a:avLst/>
@@ -6672,7 +6672,7 @@
         </p:nvSpPr>
         <p:spPr bwMode="auto">
           <a:xfrm>
-            <a:off x="2325688" y="1520825"/>
+            <a:off x="2363788" y="1520825"/>
             <a:ext cx="4319036" cy="1015663"/>
           </a:xfrm>
           <a:prstGeom prst="rect">
@@ -6899,7 +6899,7 @@
                                     </p:set>
                                     <p:animEffect transition="in" filter="wipe(left)">
                                       <p:cBhvr>
-                                        <p:cTn id="12" dur="500"/>
+                                        <p:cTn id="12" dur="1000"/>
                                         <p:tgtEl>
                                           <p:spTgt spid="230404"/>
                                         </p:tgtEl>
@@ -12741,20 +12741,20 @@
             <p:ph sz="half" idx="2"/>
             <p:extLst>
               <p:ext uri="{D42A27DB-BD31-4B8C-83A1-F6EECF244321}">
-                <p14:modId xmlns:p14="http://schemas.microsoft.com/office/powerpoint/2010/main" val="2834641728"/>
+                <p14:modId xmlns:p14="http://schemas.microsoft.com/office/powerpoint/2010/main" val="3396804093"/>
               </p:ext>
             </p:extLst>
           </p:nvPr>
         </p:nvGraphicFramePr>
         <p:xfrm>
-          <a:off x="1355725" y="2060575"/>
+          <a:off x="1304925" y="2085975"/>
           <a:ext cx="6505575" cy="1728788"/>
         </p:xfrm>
         <a:graphic>
           <a:graphicData uri="http://schemas.openxmlformats.org/presentationml/2006/ole">
             <mc:AlternateContent xmlns:mc="http://schemas.openxmlformats.org/markup-compatibility/2006">
               <mc:Choice xmlns:v="urn:schemas-microsoft-com:vml" Requires="v">
-                <p:oleObj spid="_x0000_s582714" name="Equation" r:id="rId5" imgW="1816100" imgH="482600" progId="Equation.DSMT4">
+                <p:oleObj spid="_x0000_s582717" name="Equation" r:id="rId5" imgW="1816100" imgH="482600" progId="Equation.DSMT4">
                   <p:embed/>
                 </p:oleObj>
               </mc:Choice>
@@ -12778,7 +12778,7 @@
                     </p:blipFill>
                     <p:spPr bwMode="auto">
                       <a:xfrm>
-                        <a:off x="1355725" y="2060575"/>
+                        <a:off x="1304925" y="2085975"/>
                         <a:ext cx="6505575" cy="1728788"/>
                       </a:xfrm>
                       <a:prstGeom prst="rect">
@@ -12866,82 +12866,6 @@
                 <a:latin typeface="Comic Sans MS" charset="0"/>
               </a:rPr>
               <a:t>students</a:t>
-            </a:r>
-          </a:p>
-        </p:txBody>
-      </p:sp>
-      <p:sp>
-        <p:nvSpPr>
-          <p:cNvPr id="2" name="TextBox 1"/>
-          <p:cNvSpPr txBox="1"/>
-          <p:nvPr/>
-        </p:nvSpPr>
-        <p:spPr>
-          <a:xfrm>
-            <a:off x="1070938" y="4074901"/>
-            <a:ext cx="7485217" cy="2246769"/>
-          </a:xfrm>
-          <a:prstGeom prst="rect">
-            <a:avLst/>
-          </a:prstGeom>
-          <a:noFill/>
-        </p:spPr>
-        <p:txBody>
-          <a:bodyPr wrap="none" rtlCol="0">
-            <a:spAutoFit/>
-          </a:bodyPr>
-          <a:lstStyle/>
-          <a:p>
-            <a:r>
-              <a:rPr lang="en-US" dirty="0" smtClean="0">
-                <a:latin typeface="Comic Sans MS"/>
-                <a:cs typeface="Comic Sans MS"/>
-              </a:rPr>
-              <a:t>(Actually had 2 people born</a:t>
-            </a:r>
-          </a:p>
-          <a:p>
-            <a:r>
-              <a:rPr lang="en-US" dirty="0" smtClean="0">
-                <a:latin typeface="Comic Sans MS"/>
-                <a:cs typeface="Comic Sans MS"/>
-              </a:rPr>
-              <a:t>on Feb. 29, so denominator</a:t>
-            </a:r>
-          </a:p>
-          <a:p>
-            <a:r>
-              <a:rPr lang="en-US" dirty="0" smtClean="0">
-                <a:latin typeface="Comic Sans MS"/>
-                <a:cs typeface="Comic Sans MS"/>
-              </a:rPr>
-              <a:t>1/365.25 would be better </a:t>
-            </a:r>
-            <a:r>
-              <a:rPr lang="en-US" sz="6000" b="1" dirty="0" smtClean="0">
-                <a:solidFill>
-                  <a:srgbClr val="FFFF00"/>
-                </a:solidFill>
-                <a:latin typeface="Comic Sans MS"/>
-                <a:cs typeface="Comic Sans MS"/>
-                <a:sym typeface="Wingdings"/>
-              </a:rPr>
-              <a:t></a:t>
-            </a:r>
-            <a:r>
-              <a:rPr lang="en-US" dirty="0" smtClean="0">
-                <a:latin typeface="Comic Sans MS"/>
-                <a:cs typeface="Comic Sans MS"/>
-                <a:sym typeface="Wingdings"/>
-              </a:rPr>
-              <a:t> </a:t>
-            </a:r>
-            <a:r>
-              <a:rPr lang="en-US" dirty="0" smtClean="0">
-                <a:latin typeface="Comic Sans MS"/>
-                <a:cs typeface="Comic Sans MS"/>
-              </a:rPr>
-              <a:t>)</a:t>
             </a:r>
           </a:p>
         </p:txBody>
@@ -13027,59 +12951,6 @@
                       </p:childTnLst>
                     </p:cTn>
                   </p:par>
-                  <p:par>
-                    <p:cTn id="8" fill="hold">
-                      <p:stCondLst>
-                        <p:cond delay="indefinite"/>
-                      </p:stCondLst>
-                      <p:childTnLst>
-                        <p:par>
-                          <p:cTn id="9" fill="hold">
-                            <p:stCondLst>
-                              <p:cond delay="0"/>
-                            </p:stCondLst>
-                            <p:childTnLst>
-                              <p:par>
-                                <p:cTn id="10" presetID="9" presetClass="entr" presetSubtype="0" fill="hold" grpId="0" nodeType="clickEffect">
-                                  <p:stCondLst>
-                                    <p:cond delay="0"/>
-                                  </p:stCondLst>
-                                  <p:childTnLst>
-                                    <p:set>
-                                      <p:cBhvr>
-                                        <p:cTn id="11" dur="1" fill="hold">
-                                          <p:stCondLst>
-                                            <p:cond delay="0"/>
-                                          </p:stCondLst>
-                                        </p:cTn>
-                                        <p:tgtEl>
-                                          <p:spTgt spid="2"/>
-                                        </p:tgtEl>
-                                        <p:attrNameLst>
-                                          <p:attrName>style.visibility</p:attrName>
-                                        </p:attrNameLst>
-                                      </p:cBhvr>
-                                      <p:to>
-                                        <p:strVal val="visible"/>
-                                      </p:to>
-                                    </p:set>
-                                    <p:animEffect transition="in" filter="dissolve">
-                                      <p:cBhvr>
-                                        <p:cTn id="12" dur="500"/>
-                                        <p:tgtEl>
-                                          <p:spTgt spid="2"/>
-                                        </p:tgtEl>
-                                      </p:cBhvr>
-                                    </p:animEffect>
-                                  </p:childTnLst>
-                                </p:cTn>
-                              </p:par>
-                            </p:childTnLst>
-                          </p:cTn>
-                        </p:par>
-                      </p:childTnLst>
-                    </p:cTn>
-                  </p:par>
                 </p:childTnLst>
               </p:cTn>
               <p:prevCondLst>
@@ -13101,9 +12972,6 @@
         </p:cTn>
       </p:par>
     </p:tnLst>
-    <p:bldLst>
-      <p:bldP spid="2" grpId="0"/>
-    </p:bldLst>
   </p:timing>
 </p:sld>
 </file>
@@ -13225,7 +13093,7 @@
               <a:buNone/>
             </a:pPr>
             <a:r>
-              <a:rPr lang="en-US" sz="4800" dirty="0" err="1">
+              <a:rPr lang="en-US" sz="4800" dirty="0" err="1" smtClean="0">
                 <a:solidFill>
                   <a:srgbClr val="0000FF"/>
                 </a:solidFill>
@@ -13238,7 +13106,15 @@
                   <a:srgbClr val="0000FF"/>
                 </a:solidFill>
               </a:rPr>
-              <a:t>{|P –</a:t>
+              <a:t>[|</a:t>
+            </a:r>
+            <a:r>
+              <a:rPr lang="en-US" sz="4800" dirty="0" smtClean="0">
+                <a:solidFill>
+                  <a:srgbClr val="0000FF"/>
+                </a:solidFill>
+              </a:rPr>
+              <a:t>P –</a:t>
             </a:r>
             <a:r>
               <a:rPr lang="en-US" sz="4800" i="1" dirty="0" smtClean="0">
@@ -13276,13 +13152,18 @@
               <a:t> </a:t>
             </a:r>
             <a:r>
-              <a:rPr lang="en-US" sz="4800" dirty="0">
+              <a:rPr lang="en-US" sz="4800" dirty="0" smtClean="0">
                 <a:solidFill>
                   <a:srgbClr val="0000FF"/>
                 </a:solidFill>
               </a:rPr>
-              <a:t>k}</a:t>
-            </a:r>
+              <a:t>k]</a:t>
+            </a:r>
+            <a:endParaRPr lang="en-US" sz="4800" dirty="0">
+              <a:solidFill>
+                <a:srgbClr val="0000FF"/>
+              </a:solidFill>
+            </a:endParaRPr>
           </a:p>
           <a:p>
             <a:pPr algn="ctr">
@@ -15389,7 +15270,7 @@
           <a:graphicData uri="http://schemas.openxmlformats.org/presentationml/2006/ole">
             <mc:AlternateContent xmlns:mc="http://schemas.openxmlformats.org/markup-compatibility/2006">
               <mc:Choice xmlns:v="urn:schemas-microsoft-com:vml" Requires="v">
-                <p:oleObj spid="_x0000_s585841" name="Equation" r:id="rId5" imgW="2273300" imgH="482600" progId="Equation.DSMT4">
+                <p:oleObj spid="_x0000_s585848" name="Equation" r:id="rId5" imgW="2273300" imgH="482600" progId="Equation.DSMT4">
                   <p:embed/>
                 </p:oleObj>
               </mc:Choice>
@@ -15446,7 +15327,7 @@
           <a:graphicData uri="http://schemas.openxmlformats.org/presentationml/2006/ole">
             <mc:AlternateContent xmlns:mc="http://schemas.openxmlformats.org/markup-compatibility/2006">
               <mc:Choice xmlns:v="urn:schemas-microsoft-com:vml" Requires="v">
-                <p:oleObj spid="_x0000_s585842" name="Equation" r:id="rId7" imgW="571500" imgH="241300" progId="Equation.DSMT4">
+                <p:oleObj spid="_x0000_s585849" name="Equation" r:id="rId7" imgW="571500" imgH="241300" progId="Equation.DSMT4">
                   <p:embed/>
                 </p:oleObj>
               </mc:Choice>
@@ -15528,7 +15409,7 @@
           <a:graphicData uri="http://schemas.openxmlformats.org/presentationml/2006/ole">
             <mc:AlternateContent xmlns:mc="http://schemas.openxmlformats.org/markup-compatibility/2006">
               <mc:Choice xmlns:v="urn:schemas-microsoft-com:vml" Requires="v">
-                <p:oleObj spid="_x0000_s585843" name="Equation" r:id="rId9" imgW="2476500" imgH="482600" progId="Equation.DSMT4">
+                <p:oleObj spid="_x0000_s585850" name="Equation" r:id="rId9" imgW="2476500" imgH="482600" progId="Equation.DSMT4">
                   <p:embed/>
                 </p:oleObj>
               </mc:Choice>

</xml_diff>

<commit_message>
edit law-of-large-numbers birthday-matching confidence.pptx
</commit_message>
<xml_diff>
--- a/spring13/slides13/birthday-matching.pptx
+++ b/spring13/slides13/birthday-matching.pptx
@@ -4370,28 +4370,6 @@
           <a:chExt cx="0" cy="0"/>
         </a:xfrm>
       </p:grpSpPr>
-      <p:sp>
-        <p:nvSpPr>
-          <p:cNvPr id="340994" name="Rectangle 2"/>
-          <p:cNvSpPr>
-            <a:spLocks noGrp="1" noChangeArrowheads="1"/>
-          </p:cNvSpPr>
-          <p:nvPr>
-            <p:ph type="title"/>
-          </p:nvPr>
-        </p:nvSpPr>
-        <p:spPr/>
-        <p:txBody>
-          <a:bodyPr/>
-          <a:lstStyle/>
-          <a:p>
-            <a:r>
-              <a:rPr lang="en-US" b="0"/>
-              <a:t>Birthday Pairs</a:t>
-            </a:r>
-          </a:p>
-        </p:txBody>
-      </p:sp>
       <p:graphicFrame>
         <p:nvGraphicFramePr>
           <p:cNvPr id="340996" name="Object 4"/>
@@ -4415,7 +4393,7 @@
           <a:graphicData uri="http://schemas.openxmlformats.org/presentationml/2006/ole">
             <mc:AlternateContent xmlns:mc="http://schemas.openxmlformats.org/markup-compatibility/2006">
               <mc:Choice xmlns:v="urn:schemas-microsoft-com:vml" Requires="v">
-                <p:oleObj spid="_x0000_s586811" name="Equation" r:id="rId3" imgW="1003300" imgH="457200" progId="Equation.DSMT4">
+                <p:oleObj spid="_x0000_s586813" name="Equation" r:id="rId3" imgW="1003300" imgH="457200" progId="Equation.DSMT4">
                   <p:embed/>
                 </p:oleObj>
               </mc:Choice>
@@ -4475,6 +4453,33 @@
           </a:graphicData>
         </a:graphic>
       </p:graphicFrame>
+      <p:sp>
+        <p:nvSpPr>
+          <p:cNvPr id="5" name="Rectangle 2"/>
+          <p:cNvSpPr>
+            <a:spLocks noGrp="1" noChangeArrowheads="1"/>
+          </p:cNvSpPr>
+          <p:nvPr>
+            <p:ph type="title"/>
+          </p:nvPr>
+        </p:nvSpPr>
+        <p:spPr>
+          <a:xfrm>
+            <a:off x="1295400" y="228600"/>
+            <a:ext cx="6553200" cy="838200"/>
+          </a:xfrm>
+        </p:spPr>
+        <p:txBody>
+          <a:bodyPr/>
+          <a:lstStyle/>
+          <a:p>
+            <a:r>
+              <a:rPr lang="en-US" sz="4000" dirty="0"/>
+              <a:t>Birthday Pairs</a:t>
+            </a:r>
+          </a:p>
+        </p:txBody>
+      </p:sp>
     </p:spTree>
   </p:cSld>
   <p:clrMapOvr>
@@ -4599,7 +4604,7 @@
           <a:lstStyle/>
           <a:p>
             <a:r>
-              <a:rPr lang="en-US" b="0"/>
+              <a:rPr lang="en-US" dirty="0"/>
               <a:t>Birthday Predictions</a:t>
             </a:r>
           </a:p>
@@ -5880,7 +5885,12 @@
             <p:ph type="title"/>
           </p:nvPr>
         </p:nvSpPr>
-        <p:spPr/>
+        <p:spPr>
+          <a:xfrm>
+            <a:off x="1295400" y="228600"/>
+            <a:ext cx="6553200" cy="838200"/>
+          </a:xfrm>
+        </p:spPr>
         <p:txBody>
           <a:bodyPr/>
           <a:lstStyle/>
@@ -6048,7 +6058,7 @@
           <a:graphicData uri="http://schemas.openxmlformats.org/presentationml/2006/ole">
             <mc:AlternateContent xmlns:mc="http://schemas.openxmlformats.org/markup-compatibility/2006">
               <mc:Choice xmlns:v="urn:schemas-microsoft-com:vml" Requires="v">
-                <p:oleObj spid="_x0000_s578625" name="Equation" r:id="rId6" imgW="762000" imgH="381000" progId="Equation.DSMT4">
+                <p:oleObj spid="_x0000_s578627" name="Equation" r:id="rId6" imgW="762000" imgH="381000" progId="Equation.DSMT4">
                   <p:embed/>
                 </p:oleObj>
               </mc:Choice>
@@ -6106,8 +6116,8 @@
         </p:nvSpPr>
         <p:spPr bwMode="auto">
           <a:xfrm>
-            <a:off x="604838" y="4983163"/>
-            <a:ext cx="7305087" cy="1323439"/>
+            <a:off x="1074738" y="4983163"/>
+            <a:ext cx="6946416" cy="1323439"/>
           </a:xfrm>
           <a:prstGeom prst="rect">
             <a:avLst/>
@@ -6171,7 +6181,7 @@
               <a:t>i</a:t>
             </a:r>
             <a:r>
-              <a:rPr lang="en-US" sz="4000" dirty="0" err="1" smtClean="0">
+              <a:rPr lang="en-US" sz="4000" baseline="30000" dirty="0" err="1" smtClean="0">
                 <a:latin typeface="Comic Sans MS" charset="0"/>
               </a:rPr>
               <a:t>th</a:t>
@@ -6198,12 +6208,12 @@
               <a:t>j</a:t>
             </a:r>
             <a:r>
-              <a:rPr lang="en-US" sz="4000" dirty="0" err="1" smtClean="0">
+              <a:rPr lang="en-US" sz="4000" baseline="30000" dirty="0" err="1" smtClean="0">
                 <a:latin typeface="Comic Sans MS" charset="0"/>
               </a:rPr>
               <a:t>th</a:t>
             </a:r>
-            <a:endParaRPr lang="en-US" sz="4000" dirty="0">
+            <a:endParaRPr lang="en-US" sz="4000" baseline="30000" dirty="0">
               <a:latin typeface="Comic Sans MS" charset="0"/>
             </a:endParaRPr>
           </a:p>
@@ -6602,7 +6612,7 @@
           <a:graphicData uri="http://schemas.openxmlformats.org/presentationml/2006/ole">
             <mc:AlternateContent xmlns:mc="http://schemas.openxmlformats.org/markup-compatibility/2006">
               <mc:Choice xmlns:v="urn:schemas-microsoft-com:vml" Requires="v">
-                <p:oleObj spid="_x0000_s580669" name="Equation" r:id="rId5" imgW="1752600" imgH="482600" progId="Equation.DSMT4">
+                <p:oleObj spid="_x0000_s580671" name="Equation" r:id="rId5" imgW="1752600" imgH="482600" progId="Equation.DSMT4">
                   <p:embed/>
                 </p:oleObj>
               </mc:Choice>
@@ -12709,28 +12719,6 @@
           <a:chExt cx="0" cy="0"/>
         </a:xfrm>
       </p:grpSpPr>
-      <p:sp>
-        <p:nvSpPr>
-          <p:cNvPr id="232450" name="Rectangle 2"/>
-          <p:cNvSpPr>
-            <a:spLocks noGrp="1" noChangeArrowheads="1"/>
-          </p:cNvSpPr>
-          <p:nvPr>
-            <p:ph type="title"/>
-          </p:nvPr>
-        </p:nvSpPr>
-        <p:spPr/>
-        <p:txBody>
-          <a:bodyPr/>
-          <a:lstStyle/>
-          <a:p>
-            <a:r>
-              <a:rPr lang="en-US" b="0"/>
-              <a:t>Birthday Pairs</a:t>
-            </a:r>
-          </a:p>
-        </p:txBody>
-      </p:sp>
       <p:graphicFrame>
         <p:nvGraphicFramePr>
           <p:cNvPr id="232451" name="Object 3"/>
@@ -12754,7 +12742,7 @@
           <a:graphicData uri="http://schemas.openxmlformats.org/presentationml/2006/ole">
             <mc:AlternateContent xmlns:mc="http://schemas.openxmlformats.org/markup-compatibility/2006">
               <mc:Choice xmlns:v="urn:schemas-microsoft-com:vml" Requires="v">
-                <p:oleObj spid="_x0000_s582717" name="Equation" r:id="rId5" imgW="1816100" imgH="482600" progId="Equation.DSMT4">
+                <p:oleObj spid="_x0000_s582719" name="Equation" r:id="rId5" imgW="1816100" imgH="482600" progId="Equation.DSMT4">
                   <p:embed/>
                 </p:oleObj>
               </mc:Choice>
@@ -12866,6 +12854,33 @@
                 <a:latin typeface="Comic Sans MS" charset="0"/>
               </a:rPr>
               <a:t>students</a:t>
+            </a:r>
+          </a:p>
+        </p:txBody>
+      </p:sp>
+      <p:sp>
+        <p:nvSpPr>
+          <p:cNvPr id="6" name="Rectangle 2"/>
+          <p:cNvSpPr>
+            <a:spLocks noGrp="1" noChangeArrowheads="1"/>
+          </p:cNvSpPr>
+          <p:nvPr>
+            <p:ph type="title"/>
+          </p:nvPr>
+        </p:nvSpPr>
+        <p:spPr>
+          <a:xfrm>
+            <a:off x="1295400" y="228600"/>
+            <a:ext cx="6553200" cy="838200"/>
+          </a:xfrm>
+        </p:spPr>
+        <p:txBody>
+          <a:bodyPr/>
+          <a:lstStyle/>
+          <a:p>
+            <a:r>
+              <a:rPr lang="en-US" sz="4000" dirty="0"/>
+              <a:t>Birthday Pairs</a:t>
             </a:r>
           </a:p>
         </p:txBody>
@@ -12995,28 +13010,6 @@
       </p:grpSpPr>
       <p:sp>
         <p:nvSpPr>
-          <p:cNvPr id="233474" name="Rectangle 2"/>
-          <p:cNvSpPr>
-            <a:spLocks noGrp="1" noChangeArrowheads="1"/>
-          </p:cNvSpPr>
-          <p:nvPr>
-            <p:ph type="title"/>
-          </p:nvPr>
-        </p:nvSpPr>
-        <p:spPr/>
-        <p:txBody>
-          <a:bodyPr/>
-          <a:lstStyle/>
-          <a:p>
-            <a:r>
-              <a:rPr lang="en-US" b="0"/>
-              <a:t>Birthday Pairs</a:t>
-            </a:r>
-          </a:p>
-        </p:txBody>
-      </p:sp>
-      <p:sp>
-        <p:nvSpPr>
           <p:cNvPr id="233475" name="Rectangle 3"/>
           <p:cNvSpPr>
             <a:spLocks noGrp="1" noChangeArrowheads="1"/>
@@ -13106,15 +13099,7 @@
                   <a:srgbClr val="0000FF"/>
                 </a:solidFill>
               </a:rPr>
-              <a:t>[|</a:t>
-            </a:r>
-            <a:r>
-              <a:rPr lang="en-US" sz="4800" dirty="0" smtClean="0">
-                <a:solidFill>
-                  <a:srgbClr val="0000FF"/>
-                </a:solidFill>
-              </a:rPr>
-              <a:t>P –</a:t>
+              <a:t>[|P –</a:t>
             </a:r>
             <a:r>
               <a:rPr lang="en-US" sz="4800" i="1" dirty="0" smtClean="0">
@@ -13197,6 +13182,33 @@
                 </a:solidFill>
               </a:rPr>
               <a:t>Variance easy to calculate!</a:t>
+            </a:r>
+          </a:p>
+        </p:txBody>
+      </p:sp>
+      <p:sp>
+        <p:nvSpPr>
+          <p:cNvPr id="5" name="Rectangle 2"/>
+          <p:cNvSpPr>
+            <a:spLocks noGrp="1" noChangeArrowheads="1"/>
+          </p:cNvSpPr>
+          <p:nvPr>
+            <p:ph type="title"/>
+          </p:nvPr>
+        </p:nvSpPr>
+        <p:spPr>
+          <a:xfrm>
+            <a:off x="1295400" y="228600"/>
+            <a:ext cx="6553200" cy="838200"/>
+          </a:xfrm>
+        </p:spPr>
+        <p:txBody>
+          <a:bodyPr/>
+          <a:lstStyle/>
+          <a:p>
+            <a:r>
+              <a:rPr lang="en-US" sz="4000" dirty="0"/>
+              <a:t>Birthday Pairs</a:t>
             </a:r>
           </a:p>
         </p:txBody>
@@ -13478,7 +13490,7 @@
           <a:lstStyle/>
           <a:p>
             <a:r>
-              <a:rPr lang="en-US" b="0"/>
+              <a:rPr lang="en-US" dirty="0"/>
               <a:t>Pairwise Independence</a:t>
             </a:r>
           </a:p>
@@ -14258,7 +14270,7 @@
           <a:lstStyle/>
           <a:p>
             <a:r>
-              <a:rPr lang="en-US" b="0"/>
+              <a:rPr lang="en-US" dirty="0"/>
               <a:t>Pairwise Independence</a:t>
             </a:r>
           </a:p>
@@ -15016,28 +15028,6 @@
       </p:grpSpPr>
       <p:sp>
         <p:nvSpPr>
-          <p:cNvPr id="339970" name="Rectangle 2"/>
-          <p:cNvSpPr>
-            <a:spLocks noGrp="1" noChangeArrowheads="1"/>
-          </p:cNvSpPr>
-          <p:nvPr>
-            <p:ph type="title"/>
-          </p:nvPr>
-        </p:nvSpPr>
-        <p:spPr/>
-        <p:txBody>
-          <a:bodyPr/>
-          <a:lstStyle/>
-          <a:p>
-            <a:r>
-              <a:rPr lang="en-US" b="0"/>
-              <a:t>Birthday Pairs</a:t>
-            </a:r>
-          </a:p>
-        </p:txBody>
-      </p:sp>
-      <p:sp>
-        <p:nvSpPr>
           <p:cNvPr id="339971" name="Rectangle 3"/>
           <p:cNvSpPr>
             <a:spLocks noGrp="1" noChangeArrowheads="1"/>
@@ -15270,7 +15260,7 @@
           <a:graphicData uri="http://schemas.openxmlformats.org/presentationml/2006/ole">
             <mc:AlternateContent xmlns:mc="http://schemas.openxmlformats.org/markup-compatibility/2006">
               <mc:Choice xmlns:v="urn:schemas-microsoft-com:vml" Requires="v">
-                <p:oleObj spid="_x0000_s585848" name="Equation" r:id="rId5" imgW="2273300" imgH="482600" progId="Equation.DSMT4">
+                <p:oleObj spid="_x0000_s585852" name="Equation" r:id="rId5" imgW="2273300" imgH="482600" progId="Equation.DSMT4">
                   <p:embed/>
                 </p:oleObj>
               </mc:Choice>
@@ -15327,7 +15317,7 @@
           <a:graphicData uri="http://schemas.openxmlformats.org/presentationml/2006/ole">
             <mc:AlternateContent xmlns:mc="http://schemas.openxmlformats.org/markup-compatibility/2006">
               <mc:Choice xmlns:v="urn:schemas-microsoft-com:vml" Requires="v">
-                <p:oleObj spid="_x0000_s585849" name="Equation" r:id="rId7" imgW="571500" imgH="241300" progId="Equation.DSMT4">
+                <p:oleObj spid="_x0000_s585853" name="Equation" r:id="rId7" imgW="571500" imgH="241300" progId="Equation.DSMT4">
                   <p:embed/>
                 </p:oleObj>
               </mc:Choice>
@@ -15409,7 +15399,7 @@
           <a:graphicData uri="http://schemas.openxmlformats.org/presentationml/2006/ole">
             <mc:AlternateContent xmlns:mc="http://schemas.openxmlformats.org/markup-compatibility/2006">
               <mc:Choice xmlns:v="urn:schemas-microsoft-com:vml" Requires="v">
-                <p:oleObj spid="_x0000_s585850" name="Equation" r:id="rId9" imgW="2476500" imgH="482600" progId="Equation.DSMT4">
+                <p:oleObj spid="_x0000_s585854" name="Equation" r:id="rId9" imgW="2476500" imgH="482600" progId="Equation.DSMT4">
                   <p:embed/>
                 </p:oleObj>
               </mc:Choice>
@@ -15444,6 +15434,33 @@
           </a:graphicData>
         </a:graphic>
       </p:graphicFrame>
+      <p:sp>
+        <p:nvSpPr>
+          <p:cNvPr id="10" name="Rectangle 2"/>
+          <p:cNvSpPr>
+            <a:spLocks noGrp="1" noChangeArrowheads="1"/>
+          </p:cNvSpPr>
+          <p:nvPr>
+            <p:ph type="title"/>
+          </p:nvPr>
+        </p:nvSpPr>
+        <p:spPr>
+          <a:xfrm>
+            <a:off x="1295400" y="228600"/>
+            <a:ext cx="6553200" cy="838200"/>
+          </a:xfrm>
+        </p:spPr>
+        <p:txBody>
+          <a:bodyPr/>
+          <a:lstStyle/>
+          <a:p>
+            <a:r>
+              <a:rPr lang="en-US" sz="4000" dirty="0"/>
+              <a:t>Birthday Pairs</a:t>
+            </a:r>
+          </a:p>
+        </p:txBody>
+      </p:sp>
     </p:spTree>
     <p:custDataLst>
       <p:tags r:id="rId2"/>

</xml_diff>

<commit_message>
add inf-exp & gambler slides, edit deviation slides
</commit_message>
<xml_diff>
--- a/spring13/slides13/birthday-matching.pptx
+++ b/spring13/slides13/birthday-matching.pptx
@@ -4393,7 +4393,7 @@
           <a:graphicData uri="http://schemas.openxmlformats.org/presentationml/2006/ole">
             <mc:AlternateContent xmlns:mc="http://schemas.openxmlformats.org/markup-compatibility/2006">
               <mc:Choice xmlns:v="urn:schemas-microsoft-com:vml" Requires="v">
-                <p:oleObj spid="_x0000_s586813" name="Equation" r:id="rId3" imgW="1003300" imgH="457200" progId="Equation.DSMT4">
+                <p:oleObj spid="_x0000_s586816" name="Equation" r:id="rId3" imgW="1003300" imgH="457200" progId="Equation.DSMT4">
                   <p:embed/>
                 </p:oleObj>
               </mc:Choice>
@@ -4709,14 +4709,14 @@
               <a:t>± </a:t>
             </a:r>
             <a:r>
-              <a:rPr lang="en-US" sz="4000" dirty="0" smtClean="0">
+              <a:rPr lang="en-US" sz="4000" dirty="0">
                 <a:solidFill>
                   <a:srgbClr val="0000FF"/>
                 </a:solidFill>
                 <a:ea typeface="Times New Roman" charset="0"/>
                 <a:cs typeface="Times New Roman" charset="0"/>
               </a:rPr>
-              <a:t>3</a:t>
+              <a:t>2</a:t>
             </a:r>
             <a:r>
               <a:rPr lang="en-US" sz="4000" dirty="0" smtClean="0">
@@ -4843,7 +4843,7 @@
                 <a:ea typeface="SimSun" pitchFamily="2" charset="-122"/>
                 <a:cs typeface="SimSun" pitchFamily="2" charset="-122"/>
               </a:rPr>
-              <a:t>35</a:t>
+              <a:t>43</a:t>
             </a:r>
             <a:r>
               <a:rPr lang="en-US" sz="4000" dirty="0" smtClean="0">
@@ -4869,7 +4869,7 @@
                 <a:ea typeface="SimSun" pitchFamily="2" charset="-122"/>
                 <a:cs typeface="SimSun" pitchFamily="2" charset="-122"/>
               </a:rPr>
-              <a:t>81</a:t>
+              <a:t>73</a:t>
             </a:r>
             <a:r>
               <a:rPr lang="en-US" sz="4000" dirty="0" smtClean="0">
@@ -6058,7 +6058,7 @@
           <a:graphicData uri="http://schemas.openxmlformats.org/presentationml/2006/ole">
             <mc:AlternateContent xmlns:mc="http://schemas.openxmlformats.org/markup-compatibility/2006">
               <mc:Choice xmlns:v="urn:schemas-microsoft-com:vml" Requires="v">
-                <p:oleObj spid="_x0000_s578627" name="Equation" r:id="rId6" imgW="762000" imgH="381000" progId="Equation.DSMT4">
+                <p:oleObj spid="_x0000_s578630" name="Equation" r:id="rId6" imgW="762000" imgH="381000" progId="Equation.DSMT4">
                   <p:embed/>
                 </p:oleObj>
               </mc:Choice>
@@ -6612,7 +6612,7 @@
           <a:graphicData uri="http://schemas.openxmlformats.org/presentationml/2006/ole">
             <mc:AlternateContent xmlns:mc="http://schemas.openxmlformats.org/markup-compatibility/2006">
               <mc:Choice xmlns:v="urn:schemas-microsoft-com:vml" Requires="v">
-                <p:oleObj spid="_x0000_s580671" name="Equation" r:id="rId5" imgW="1752600" imgH="482600" progId="Equation.DSMT4">
+                <p:oleObj spid="_x0000_s580674" name="Equation" r:id="rId5" imgW="1752600" imgH="482600" progId="Equation.DSMT4">
                   <p:embed/>
                 </p:oleObj>
               </mc:Choice>
@@ -12742,7 +12742,7 @@
           <a:graphicData uri="http://schemas.openxmlformats.org/presentationml/2006/ole">
             <mc:AlternateContent xmlns:mc="http://schemas.openxmlformats.org/markup-compatibility/2006">
               <mc:Choice xmlns:v="urn:schemas-microsoft-com:vml" Requires="v">
-                <p:oleObj spid="_x0000_s582719" name="Equation" r:id="rId5" imgW="1816100" imgH="482600" progId="Equation.DSMT4">
+                <p:oleObj spid="_x0000_s582722" name="Equation" r:id="rId5" imgW="1816100" imgH="482600" progId="Equation.DSMT4">
                   <p:embed/>
                 </p:oleObj>
               </mc:Choice>
@@ -15260,7 +15260,7 @@
           <a:graphicData uri="http://schemas.openxmlformats.org/presentationml/2006/ole">
             <mc:AlternateContent xmlns:mc="http://schemas.openxmlformats.org/markup-compatibility/2006">
               <mc:Choice xmlns:v="urn:schemas-microsoft-com:vml" Requires="v">
-                <p:oleObj spid="_x0000_s585852" name="Equation" r:id="rId5" imgW="2273300" imgH="482600" progId="Equation.DSMT4">
+                <p:oleObj spid="_x0000_s585859" name="Equation" r:id="rId5" imgW="2273300" imgH="482600" progId="Equation.DSMT4">
                   <p:embed/>
                 </p:oleObj>
               </mc:Choice>
@@ -15317,7 +15317,7 @@
           <a:graphicData uri="http://schemas.openxmlformats.org/presentationml/2006/ole">
             <mc:AlternateContent xmlns:mc="http://schemas.openxmlformats.org/markup-compatibility/2006">
               <mc:Choice xmlns:v="urn:schemas-microsoft-com:vml" Requires="v">
-                <p:oleObj spid="_x0000_s585853" name="Equation" r:id="rId7" imgW="571500" imgH="241300" progId="Equation.DSMT4">
+                <p:oleObj spid="_x0000_s585860" name="Equation" r:id="rId7" imgW="571500" imgH="241300" progId="Equation.DSMT4">
                   <p:embed/>
                 </p:oleObj>
               </mc:Choice>
@@ -15399,7 +15399,7 @@
           <a:graphicData uri="http://schemas.openxmlformats.org/presentationml/2006/ole">
             <mc:AlternateContent xmlns:mc="http://schemas.openxmlformats.org/markup-compatibility/2006">
               <mc:Choice xmlns:v="urn:schemas-microsoft-com:vml" Requires="v">
-                <p:oleObj spid="_x0000_s585854" name="Equation" r:id="rId9" imgW="2476500" imgH="482600" progId="Equation.DSMT4">
+                <p:oleObj spid="_x0000_s585861" name="Equation" r:id="rId9" imgW="2476500" imgH="482600" progId="Equation.DSMT4">
                   <p:embed/>
                 </p:oleObj>
               </mc:Choice>

</xml_diff>

<commit_message>
law, bday, confidence.pptx edits
</commit_message>
<xml_diff>
--- a/spring13/slides13/birthday-matching.pptx
+++ b/spring13/slides13/birthday-matching.pptx
@@ -6,10 +6,10 @@
     <p:sldMasterId id="2147483687" r:id="rId2"/>
   </p:sldMasterIdLst>
   <p:notesMasterIdLst>
-    <p:notesMasterId r:id="rId17"/>
+    <p:notesMasterId r:id="rId15"/>
   </p:notesMasterIdLst>
   <p:handoutMasterIdLst>
-    <p:handoutMasterId r:id="rId18"/>
+    <p:handoutMasterId r:id="rId16"/>
   </p:handoutMasterIdLst>
   <p:sldIdLst>
     <p:sldId id="816" r:id="rId3"/>
@@ -21,16 +21,14 @@
     <p:sldId id="863" r:id="rId9"/>
     <p:sldId id="857" r:id="rId10"/>
     <p:sldId id="858" r:id="rId11"/>
-    <p:sldId id="859" r:id="rId12"/>
-    <p:sldId id="860" r:id="rId13"/>
-    <p:sldId id="861" r:id="rId14"/>
-    <p:sldId id="862" r:id="rId15"/>
-    <p:sldId id="864" r:id="rId16"/>
+    <p:sldId id="860" r:id="rId12"/>
+    <p:sldId id="862" r:id="rId13"/>
+    <p:sldId id="864" r:id="rId14"/>
   </p:sldIdLst>
   <p:sldSz cx="9144000" cy="6858000" type="screen4x3"/>
   <p:notesSz cx="9601200" cy="7315200"/>
   <p:custDataLst>
-    <p:tags r:id="rId20"/>
+    <p:tags r:id="rId18"/>
   </p:custDataLst>
   <p:defaultTextStyle>
     <a:defPPr>
@@ -1061,7 +1059,7 @@
               <a:pPr>
                 <a:defRPr/>
               </a:pPr>
-              <a:t>11</a:t>
+              <a:t>10</a:t>
             </a:fld>
             <a:endParaRPr lang="en-US"/>
           </a:p>
@@ -1151,7 +1149,7 @@
               <a:pPr>
                 <a:defRPr/>
               </a:pPr>
-              <a:t>13</a:t>
+              <a:t>11</a:t>
             </a:fld>
             <a:endParaRPr lang="en-US"/>
           </a:p>
@@ -1161,6 +1159,96 @@
     <p:extLst>
       <p:ext uri="{BB962C8B-B14F-4D97-AF65-F5344CB8AC3E}">
         <p14:creationId xmlns:p14="http://schemas.microsoft.com/office/powerpoint/2010/main" val="1073185603"/>
+      </p:ext>
+    </p:extLst>
+  </p:cSld>
+  <p:clrMapOvr>
+    <a:masterClrMapping/>
+  </p:clrMapOvr>
+</p:notes>
+</file>
+
+<file path=ppt/notesSlides/notesSlide12.xml><?xml version="1.0" encoding="utf-8"?>
+<p:notes xmlns:a="http://schemas.openxmlformats.org/drawingml/2006/main" xmlns:r="http://schemas.openxmlformats.org/officeDocument/2006/relationships" xmlns:p="http://schemas.openxmlformats.org/presentationml/2006/main">
+  <p:cSld>
+    <p:spTree>
+      <p:nvGrpSpPr>
+        <p:cNvPr id="1" name=""/>
+        <p:cNvGrpSpPr/>
+        <p:nvPr/>
+      </p:nvGrpSpPr>
+      <p:grpSpPr>
+        <a:xfrm>
+          <a:off x="0" y="0"/>
+          <a:ext cx="0" cy="0"/>
+          <a:chOff x="0" y="0"/>
+          <a:chExt cx="0" cy="0"/>
+        </a:xfrm>
+      </p:grpSpPr>
+      <p:sp>
+        <p:nvSpPr>
+          <p:cNvPr id="2" name="Slide Image Placeholder 1"/>
+          <p:cNvSpPr>
+            <a:spLocks noGrp="1" noRot="1" noChangeAspect="1"/>
+          </p:cNvSpPr>
+          <p:nvPr>
+            <p:ph type="sldImg"/>
+          </p:nvPr>
+        </p:nvSpPr>
+        <p:spPr/>
+      </p:sp>
+      <p:sp>
+        <p:nvSpPr>
+          <p:cNvPr id="3" name="Notes Placeholder 2"/>
+          <p:cNvSpPr>
+            <a:spLocks noGrp="1"/>
+          </p:cNvSpPr>
+          <p:nvPr>
+            <p:ph type="body" idx="1"/>
+          </p:nvPr>
+        </p:nvSpPr>
+        <p:spPr/>
+        <p:txBody>
+          <a:bodyPr/>
+          <a:lstStyle/>
+          <a:p>
+            <a:endParaRPr lang="en-US"/>
+          </a:p>
+        </p:txBody>
+      </p:sp>
+      <p:sp>
+        <p:nvSpPr>
+          <p:cNvPr id="4" name="Slide Number Placeholder 3"/>
+          <p:cNvSpPr>
+            <a:spLocks noGrp="1"/>
+          </p:cNvSpPr>
+          <p:nvPr>
+            <p:ph type="sldNum" sz="quarter" idx="10"/>
+          </p:nvPr>
+        </p:nvSpPr>
+        <p:spPr/>
+        <p:txBody>
+          <a:bodyPr/>
+          <a:lstStyle/>
+          <a:p>
+            <a:pPr>
+              <a:defRPr/>
+            </a:pPr>
+            <a:fld id="{A32D937A-A834-4882-89DE-8A0AB0171B36}" type="slidenum">
+              <a:rPr lang="en-US" smtClean="0"/>
+              <a:pPr>
+                <a:defRPr/>
+              </a:pPr>
+              <a:t>12</a:t>
+            </a:fld>
+            <a:endParaRPr lang="en-US"/>
+          </a:p>
+        </p:txBody>
+      </p:sp>
+    </p:spTree>
+    <p:extLst>
+      <p:ext uri="{BB962C8B-B14F-4D97-AF65-F5344CB8AC3E}">
+        <p14:creationId xmlns:p14="http://schemas.microsoft.com/office/powerpoint/2010/main" val="1878385450"/>
       </p:ext>
     </p:extLst>
   </p:cSld>
@@ -2005,6 +2093,9 @@
   <p:clrMapOvr>
     <a:masterClrMapping/>
   </p:clrMapOvr>
+  <p:transition xmlns:p14="http://schemas.microsoft.com/office/powerpoint/2010/main" spd="slow" advClick="0">
+    <p:fade/>
+  </p:transition>
   <p:timing>
     <p:tnLst>
       <p:par>
@@ -2112,6 +2203,9 @@
   <p:clrMapOvr>
     <a:masterClrMapping/>
   </p:clrMapOvr>
+  <p:transition xmlns:p14="http://schemas.microsoft.com/office/powerpoint/2010/main" spd="slow" advClick="0">
+    <p:fade/>
+  </p:transition>
   <p:timing>
     <p:tnLst>
       <p:par>
@@ -2167,6 +2261,9 @@
   <p:clrMapOvr>
     <a:masterClrMapping/>
   </p:clrMapOvr>
+  <p:transition xmlns:p14="http://schemas.microsoft.com/office/powerpoint/2010/main" spd="slow" advClick="0">
+    <p:fade/>
+  </p:transition>
   <p:timing>
     <p:tnLst>
       <p:par>
@@ -2199,6 +2296,9 @@
   <p:clrMapOvr>
     <a:masterClrMapping/>
   </p:clrMapOvr>
+  <p:transition xmlns:p14="http://schemas.microsoft.com/office/powerpoint/2010/main" spd="slow" advClick="0">
+    <p:fade/>
+  </p:transition>
   <p:timing>
     <p:tnLst>
       <p:par>
@@ -2373,6 +2473,9 @@
   <p:clrMapOvr>
     <a:masterClrMapping/>
   </p:clrMapOvr>
+  <p:transition xmlns:p14="http://schemas.microsoft.com/office/powerpoint/2010/main" spd="slow" advClick="0">
+    <p:fade/>
+  </p:transition>
   <p:timing>
     <p:tnLst>
       <p:par>
@@ -2598,6 +2701,9 @@
   <p:clrMapOvr>
     <a:masterClrMapping/>
   </p:clrMapOvr>
+  <p:transition xmlns:p14="http://schemas.microsoft.com/office/powerpoint/2010/main" spd="slow" advClick="0">
+    <p:fade/>
+  </p:transition>
   <p:timing>
     <p:tnLst>
       <p:par>
@@ -2772,6 +2878,9 @@
   <p:clrMapOvr>
     <a:masterClrMapping/>
   </p:clrMapOvr>
+  <p:transition xmlns:p14="http://schemas.microsoft.com/office/powerpoint/2010/main" spd="slow" advClick="0">
+    <p:fade/>
+  </p:transition>
   <p:timing>
     <p:tnLst>
       <p:par>
@@ -2804,6 +2913,9 @@
   <p:clrMapOvr>
     <a:masterClrMapping/>
   </p:clrMapOvr>
+  <p:transition xmlns:p14="http://schemas.microsoft.com/office/powerpoint/2010/main" spd="slow" advClick="0">
+    <p:fade/>
+  </p:transition>
   <p:timing>
     <p:tnLst>
       <p:par>
@@ -3142,6 +3254,9 @@
     <p:sldLayoutId id="2147483689" r:id="rId6"/>
     <p:sldLayoutId id="2147483690" r:id="rId7"/>
   </p:sldLayoutIdLst>
+  <p:transition xmlns:p14="http://schemas.microsoft.com/office/powerpoint/2010/main" spd="slow" advClick="0">
+    <p:fade/>
+  </p:transition>
   <p:timing>
     <p:tnLst>
       <p:par>
@@ -3772,6 +3887,9 @@
   <p:sldLayoutIdLst>
     <p:sldLayoutId id="2147483688" r:id="rId1"/>
   </p:sldLayoutIdLst>
+  <p:transition xmlns:p14="http://schemas.microsoft.com/office/powerpoint/2010/main" spd="slow" advClick="0">
+    <p:fade/>
+  </p:transition>
   <p:timing>
     <p:tnLst>
       <p:par>
@@ -4336,12 +4454,12 @@
   <p:clrMapOvr>
     <a:masterClrMapping/>
   </p:clrMapOvr>
-  <mc:AlternateContent xmlns:mc="http://schemas.openxmlformats.org/markup-compatibility/2006" xmlns:p14="http://schemas.microsoft.com/office/powerpoint/2010/main">
-    <mc:Choice Requires="p14">
-      <p:transition p14:dur="0" advTm="24298"/>
+  <mc:AlternateContent xmlns:mc="http://schemas.openxmlformats.org/markup-compatibility/2006">
+    <mc:Choice xmlns:p14="http://schemas.microsoft.com/office/powerpoint/2010/main" Requires="p14">
+      <p:transition p14:dur="0" advClick="0"/>
     </mc:Choice>
-    <mc:Fallback xmlns="">
-      <p:transition xmlns:p14="http://schemas.microsoft.com/office/powerpoint/2010/main" advTm="24298"/>
+    <mc:Fallback>
+      <p:transition xmlns:p14="http://schemas.microsoft.com/office/powerpoint/2010/main" advClick="0"/>
     </mc:Fallback>
   </mc:AlternateContent>
   <p:timing>
@@ -4355,224 +4473,6 @@
 </file>
 
 <file path=ppt/slides/slide10.xml><?xml version="1.0" encoding="utf-8"?>
-<p:sld xmlns:a="http://schemas.openxmlformats.org/drawingml/2006/main" xmlns:r="http://schemas.openxmlformats.org/officeDocument/2006/relationships" xmlns:p="http://schemas.openxmlformats.org/presentationml/2006/main" show="0">
-  <p:cSld>
-    <p:spTree>
-      <p:nvGrpSpPr>
-        <p:cNvPr id="1" name=""/>
-        <p:cNvGrpSpPr/>
-        <p:nvPr/>
-      </p:nvGrpSpPr>
-      <p:grpSpPr>
-        <a:xfrm>
-          <a:off x="0" y="0"/>
-          <a:ext cx="0" cy="0"/>
-          <a:chOff x="0" y="0"/>
-          <a:chExt cx="0" cy="0"/>
-        </a:xfrm>
-      </p:grpSpPr>
-      <p:graphicFrame>
-        <p:nvGraphicFramePr>
-          <p:cNvPr id="340996" name="Object 4"/>
-          <p:cNvGraphicFramePr>
-            <a:graphicFrameLocks noGrp="1" noChangeAspect="1"/>
-          </p:cNvGraphicFramePr>
-          <p:nvPr>
-            <p:ph sz="half" idx="2"/>
-            <p:extLst>
-              <p:ext uri="{D42A27DB-BD31-4B8C-83A1-F6EECF244321}">
-                <p14:modId xmlns:p14="http://schemas.microsoft.com/office/powerpoint/2010/main" val="3333800842"/>
-              </p:ext>
-            </p:extLst>
-          </p:nvPr>
-        </p:nvGraphicFramePr>
-        <p:xfrm>
-          <a:off x="2235200" y="2538413"/>
-          <a:ext cx="4521200" cy="2060575"/>
-        </p:xfrm>
-        <a:graphic>
-          <a:graphicData uri="http://schemas.openxmlformats.org/presentationml/2006/ole">
-            <mc:AlternateContent xmlns:mc="http://schemas.openxmlformats.org/markup-compatibility/2006">
-              <mc:Choice xmlns:v="urn:schemas-microsoft-com:vml" Requires="v">
-                <p:oleObj spid="_x0000_s586821" name="Equation" r:id="rId3" imgW="1003300" imgH="457200" progId="Equation.DSMT4">
-                  <p:embed/>
-                </p:oleObj>
-              </mc:Choice>
-              <mc:Fallback>
-                <p:oleObj name="Equation" r:id="rId3" imgW="1003300" imgH="457200" progId="Equation.DSMT4">
-                  <p:embed/>
-                  <p:pic>
-                    <p:nvPicPr>
-                      <p:cNvPr id="0" name="Picture 2"/>
-                      <p:cNvPicPr>
-                        <a:picLocks noChangeAspect="1" noChangeArrowheads="1"/>
-                      </p:cNvPicPr>
-                      <p:nvPr/>
-                    </p:nvPicPr>
-                    <p:blipFill>
-                      <a:blip r:embed="rId4"/>
-                      <a:srcRect/>
-                      <a:stretch>
-                        <a:fillRect/>
-                      </a:stretch>
-                    </p:blipFill>
-                    <p:spPr bwMode="auto">
-                      <a:xfrm>
-                        <a:off x="2235200" y="2538413"/>
-                        <a:ext cx="4521200" cy="2060575"/>
-                      </a:xfrm>
-                      <a:prstGeom prst="rect">
-                        <a:avLst/>
-                      </a:prstGeom>
-                      <a:noFill/>
-                      <a:effectLst/>
-                      <a:extLst>
-                        <a:ext uri="{909E8E84-426E-40dd-AFC4-6F175D3DCCD1}">
-                          <a14:hiddenFill xmlns:a14="http://schemas.microsoft.com/office/drawing/2010/main">
-                            <a:solidFill>
-                              <a:srgbClr val="FFFFFF"/>
-                            </a:solidFill>
-                          </a14:hiddenFill>
-                        </a:ext>
-                        <a:ext uri="{AF507438-7753-43e0-B8FC-AC1667EBCBE1}">
-                          <a14:hiddenEffects xmlns:a14="http://schemas.microsoft.com/office/drawing/2010/main">
-                            <a:effectLst>
-                              <a:outerShdw blurRad="63500" dist="38099" dir="2700000" algn="ctr" rotWithShape="0">
-                                <a:srgbClr val="808080">
-                                  <a:alpha val="74998"/>
-                                </a:srgbClr>
-                              </a:outerShdw>
-                            </a:effectLst>
-                          </a14:hiddenEffects>
-                        </a:ext>
-                      </a:extLst>
-                    </p:spPr>
-                  </p:pic>
-                </p:oleObj>
-              </mc:Fallback>
-            </mc:AlternateContent>
-          </a:graphicData>
-        </a:graphic>
-      </p:graphicFrame>
-      <p:sp>
-        <p:nvSpPr>
-          <p:cNvPr id="5" name="Rectangle 2"/>
-          <p:cNvSpPr>
-            <a:spLocks noGrp="1" noChangeArrowheads="1"/>
-          </p:cNvSpPr>
-          <p:nvPr>
-            <p:ph type="title"/>
-          </p:nvPr>
-        </p:nvSpPr>
-        <p:spPr>
-          <a:xfrm>
-            <a:off x="1295400" y="228600"/>
-            <a:ext cx="6553200" cy="838200"/>
-          </a:xfrm>
-        </p:spPr>
-        <p:txBody>
-          <a:bodyPr/>
-          <a:lstStyle/>
-          <a:p>
-            <a:r>
-              <a:rPr lang="en-US" sz="4000" dirty="0"/>
-              <a:t>Birthday Pairs</a:t>
-            </a:r>
-          </a:p>
-        </p:txBody>
-      </p:sp>
-    </p:spTree>
-  </p:cSld>
-  <p:clrMapOvr>
-    <a:masterClrMapping/>
-  </p:clrMapOvr>
-  <mc:AlternateContent xmlns:mc="http://schemas.openxmlformats.org/markup-compatibility/2006">
-    <mc:Choice xmlns:p14="http://schemas.microsoft.com/office/powerpoint/2010/main" Requires="p14">
-      <p:transition spd="slow" p14:dur="2000"/>
-    </mc:Choice>
-    <mc:Fallback>
-      <p:transition xmlns:p14="http://schemas.microsoft.com/office/powerpoint/2010/main" spd="slow"/>
-    </mc:Fallback>
-  </mc:AlternateContent>
-  <p:timing>
-    <p:tnLst>
-      <p:par>
-        <p:cTn xmlns:p14="http://schemas.microsoft.com/office/powerpoint/2010/main" id="1" dur="indefinite" restart="never" nodeType="tmRoot">
-          <p:childTnLst>
-            <p:seq concurrent="1" nextAc="seek">
-              <p:cTn id="2" dur="indefinite" nodeType="mainSeq">
-                <p:childTnLst>
-                  <p:par>
-                    <p:cTn id="3" fill="hold">
-                      <p:stCondLst>
-                        <p:cond delay="indefinite"/>
-                      </p:stCondLst>
-                      <p:childTnLst>
-                        <p:par>
-                          <p:cTn id="4" fill="hold">
-                            <p:stCondLst>
-                              <p:cond delay="0"/>
-                            </p:stCondLst>
-                            <p:childTnLst>
-                              <p:par>
-                                <p:cTn id="5" presetID="1" presetClass="entr" presetSubtype="0" fill="hold" nodeType="clickEffect">
-                                  <p:stCondLst>
-                                    <p:cond delay="0"/>
-                                  </p:stCondLst>
-                                  <p:childTnLst>
-                                    <p:set>
-                                      <p:cBhvr>
-                                        <p:cTn id="6" dur="1" fill="hold">
-                                          <p:stCondLst>
-                                            <p:cond delay="0"/>
-                                          </p:stCondLst>
-                                        </p:cTn>
-                                        <p:tgtEl>
-                                          <p:spTgt spid="340996"/>
-                                        </p:tgtEl>
-                                        <p:attrNameLst>
-                                          <p:attrName>style.visibility</p:attrName>
-                                        </p:attrNameLst>
-                                      </p:cBhvr>
-                                      <p:to>
-                                        <p:strVal val="visible"/>
-                                      </p:to>
-                                    </p:set>
-                                  </p:childTnLst>
-                                </p:cTn>
-                              </p:par>
-                            </p:childTnLst>
-                          </p:cTn>
-                        </p:par>
-                      </p:childTnLst>
-                    </p:cTn>
-                  </p:par>
-                </p:childTnLst>
-              </p:cTn>
-              <p:prevCondLst>
-                <p:cond evt="onPrev" delay="0">
-                  <p:tgtEl>
-                    <p:sldTgt/>
-                  </p:tgtEl>
-                </p:cond>
-              </p:prevCondLst>
-              <p:nextCondLst>
-                <p:cond evt="onNext" delay="0">
-                  <p:tgtEl>
-                    <p:sldTgt/>
-                  </p:tgtEl>
-                </p:cond>
-              </p:nextCondLst>
-            </p:seq>
-          </p:childTnLst>
-        </p:cTn>
-      </p:par>
-    </p:tnLst>
-  </p:timing>
-</p:sld>
-</file>
-
-<file path=ppt/slides/slide11.xml><?xml version="1.0" encoding="utf-8"?>
 <p:sld xmlns:a="http://schemas.openxmlformats.org/drawingml/2006/main" xmlns:r="http://schemas.openxmlformats.org/officeDocument/2006/relationships" xmlns:p="http://schemas.openxmlformats.org/presentationml/2006/main">
   <p:cSld>
     <p:spTree>
@@ -4687,7 +4587,7 @@
                 <a:cs typeface="SimSun" pitchFamily="2" charset="-122"/>
                 <a:sym typeface="Greek Symbols" pitchFamily="18" charset="2"/>
               </a:rPr>
-              <a:t>57.8</a:t>
+              <a:t>16.4</a:t>
             </a:r>
             <a:r>
               <a:rPr lang="en-US" altLang="zh-CN" sz="4000" dirty="0" smtClean="0">
@@ -4837,7 +4737,7 @@
                 <a:ea typeface="SimSun" pitchFamily="2" charset="-122"/>
                 <a:cs typeface="SimSun" pitchFamily="2" charset="-122"/>
               </a:rPr>
-              <a:t>43</a:t>
+              <a:t>9</a:t>
             </a:r>
             <a:r>
               <a:rPr lang="en-US" sz="4000" dirty="0" smtClean="0">
@@ -4848,12 +4748,16 @@
               <a:t> </a:t>
             </a:r>
             <a:r>
+              <a:rPr lang="en-US" sz="4000" dirty="0"/>
+              <a:t>to</a:t>
+            </a:r>
+            <a:r>
               <a:rPr lang="en-US" sz="4000" dirty="0">
                 <a:solidFill>
                   <a:srgbClr val="0000FF"/>
                 </a:solidFill>
               </a:rPr>
-              <a:t>to </a:t>
+              <a:t> </a:t>
             </a:r>
             <a:r>
               <a:rPr lang="en-US" sz="4000" dirty="0" smtClean="0">
@@ -4863,7 +4767,7 @@
                 <a:ea typeface="SimSun" pitchFamily="2" charset="-122"/>
                 <a:cs typeface="SimSun" pitchFamily="2" charset="-122"/>
               </a:rPr>
-              <a:t>73</a:t>
+              <a:t>25</a:t>
             </a:r>
             <a:r>
               <a:rPr lang="en-US" sz="4000" dirty="0" smtClean="0">
@@ -4876,10 +4780,26 @@
             <a:r>
               <a:rPr lang="en-US" sz="4000" dirty="0">
                 <a:solidFill>
+                  <a:srgbClr val="000000"/>
+                </a:solidFill>
+              </a:rPr>
+              <a:t>pairs </a:t>
+            </a:r>
+            <a:r>
+              <a:rPr lang="en-US" sz="4000" dirty="0">
+                <a:solidFill>
                   <a:srgbClr val="0000FF"/>
                 </a:solidFill>
               </a:rPr>
-              <a:t>pairs 75% of the time</a:t>
+              <a:t>75% </a:t>
+            </a:r>
+            <a:r>
+              <a:rPr lang="en-US" sz="4000" dirty="0">
+                <a:solidFill>
+                  <a:srgbClr val="000000"/>
+                </a:solidFill>
+              </a:rPr>
+              <a:t>of the time</a:t>
             </a:r>
           </a:p>
           <a:p>
@@ -4905,7 +4825,7 @@
                   <a:srgbClr val="FF00FF"/>
                 </a:solidFill>
               </a:rPr>
-              <a:t>64</a:t>
+              <a:t>21</a:t>
             </a:r>
             <a:r>
               <a:rPr lang="en-US" sz="4000" dirty="0" smtClean="0">
@@ -4935,7 +4855,15 @@
             </a:r>
             <a:r>
               <a:rPr lang="en-US" sz="4000" dirty="0" smtClean="0"/>
-              <a:t>(40 pairs &amp; 8 </a:t>
+              <a:t>(12 </a:t>
+            </a:r>
+            <a:r>
+              <a:rPr lang="en-US" sz="4000" dirty="0" smtClean="0"/>
+              <a:t>pairs &amp; </a:t>
+            </a:r>
+            <a:r>
+              <a:rPr lang="en-US" sz="4000" dirty="0" smtClean="0"/>
+              <a:t>3 </a:t>
             </a:r>
             <a:r>
               <a:rPr lang="en-US" sz="4000" dirty="0"/>
@@ -4952,18 +4880,9 @@
   <p:clrMapOvr>
     <a:masterClrMapping/>
   </p:clrMapOvr>
-  <mc:AlternateContent xmlns:mc="http://schemas.openxmlformats.org/markup-compatibility/2006" xmlns:p14="http://schemas.microsoft.com/office/powerpoint/2010/main">
-    <mc:Choice Requires="p14">
-      <p:transition spd="med" p14:dur="700" advTm="63433">
-        <p:fade/>
-      </p:transition>
-    </mc:Choice>
-    <mc:Fallback xmlns="">
-      <p:transition xmlns:p14="http://schemas.microsoft.com/office/powerpoint/2010/main" spd="med" advTm="63433">
-        <p:fade/>
-      </p:transition>
-    </mc:Fallback>
-  </mc:AlternateContent>
+  <p:transition xmlns:p14="http://schemas.microsoft.com/office/powerpoint/2010/main" spd="slow" advClick="0">
+    <p:fade/>
+  </p:transition>
   <p:timing>
     <p:tnLst>
       <p:par>
@@ -5287,7 +5206,7 @@
 </p:sld>
 </file>
 
-<file path=ppt/slides/slide12.xml><?xml version="1.0" encoding="utf-8"?>
+<file path=ppt/slides/slide11.xml><?xml version="1.0" encoding="utf-8"?>
 <p:sld xmlns:a="http://schemas.openxmlformats.org/drawingml/2006/main" xmlns:r="http://schemas.openxmlformats.org/officeDocument/2006/relationships" xmlns:p="http://schemas.openxmlformats.org/presentationml/2006/main" show="0">
   <p:cSld>
     <p:spTree>
@@ -5321,269 +5240,6 @@
           <a:p>
             <a:r>
               <a:rPr lang="en-US" dirty="0" smtClean="0"/>
-              <a:t>Spring ’11 Matching Birthdays </a:t>
-            </a:r>
-            <a:endParaRPr lang="en-US" dirty="0"/>
-          </a:p>
-        </p:txBody>
-      </p:sp>
-      <p:sp>
-        <p:nvSpPr>
-          <p:cNvPr id="3" name="Content Placeholder 2"/>
-          <p:cNvSpPr>
-            <a:spLocks noGrp="1"/>
-          </p:cNvSpPr>
-          <p:nvPr>
-            <p:ph idx="1"/>
-          </p:nvPr>
-        </p:nvSpPr>
-        <p:spPr>
-          <a:xfrm>
-            <a:off x="1058274" y="1154999"/>
-            <a:ext cx="2761593" cy="4544828"/>
-          </a:xfrm>
-        </p:spPr>
-        <p:txBody>
-          <a:bodyPr/>
-          <a:lstStyle/>
-          <a:p>
-            <a:pPr marL="742950" indent="-742950">
-              <a:buFont typeface="+mj-lt"/>
-              <a:buAutoNum type="arabicPeriod"/>
-            </a:pPr>
-            <a:r>
-              <a:rPr lang="en-US" sz="4000" dirty="0" smtClean="0"/>
-              <a:t>Jan 20</a:t>
-            </a:r>
-          </a:p>
-          <a:p>
-            <a:pPr marL="742950" indent="-742950">
-              <a:buFont typeface="+mj-lt"/>
-              <a:buAutoNum type="arabicPeriod"/>
-            </a:pPr>
-            <a:r>
-              <a:rPr lang="en-US" sz="4000" dirty="0" smtClean="0"/>
-              <a:t>Jan 22</a:t>
-            </a:r>
-          </a:p>
-          <a:p>
-            <a:pPr marL="742950" indent="-742950">
-              <a:buFont typeface="+mj-lt"/>
-              <a:buAutoNum type="arabicPeriod"/>
-            </a:pPr>
-            <a:r>
-              <a:rPr lang="en-US" sz="4000" dirty="0" smtClean="0"/>
-              <a:t>Jan 23</a:t>
-            </a:r>
-          </a:p>
-          <a:p>
-            <a:pPr marL="742950" indent="-742950">
-              <a:buFont typeface="+mj-lt"/>
-              <a:buAutoNum type="arabicPeriod"/>
-            </a:pPr>
-            <a:r>
-              <a:rPr lang="en-US" sz="4000" dirty="0" smtClean="0"/>
-              <a:t>Apr 04</a:t>
-            </a:r>
-          </a:p>
-          <a:p>
-            <a:pPr marL="742950" indent="-742950">
-              <a:buFont typeface="+mj-lt"/>
-              <a:buAutoNum type="arabicPeriod"/>
-            </a:pPr>
-            <a:r>
-              <a:rPr lang="en-US" sz="4000" dirty="0" smtClean="0"/>
-              <a:t>May 12</a:t>
-            </a:r>
-          </a:p>
-          <a:p>
-            <a:pPr marL="742950" indent="-742950">
-              <a:buFont typeface="+mj-lt"/>
-              <a:buAutoNum type="arabicPeriod"/>
-            </a:pPr>
-            <a:r>
-              <a:rPr lang="en-US" sz="4000" dirty="0" smtClean="0"/>
-              <a:t>May 14</a:t>
-            </a:r>
-          </a:p>
-        </p:txBody>
-      </p:sp>
-      <p:sp>
-        <p:nvSpPr>
-          <p:cNvPr id="7" name="Content Placeholder 2"/>
-          <p:cNvSpPr txBox="1">
-            <a:spLocks/>
-          </p:cNvSpPr>
-          <p:nvPr/>
-        </p:nvSpPr>
-        <p:spPr bwMode="auto">
-          <a:xfrm>
-            <a:off x="4781440" y="1154999"/>
-            <a:ext cx="2761593" cy="4544828"/>
-          </a:xfrm>
-          <a:prstGeom prst="rect">
-            <a:avLst/>
-          </a:prstGeom>
-          <a:noFill/>
-          <a:ln w="9525">
-            <a:noFill/>
-            <a:miter lim="800000"/>
-            <a:headEnd/>
-            <a:tailEnd/>
-          </a:ln>
-        </p:spPr>
-        <p:txBody>
-          <a:bodyPr vert="horz" wrap="square" lIns="91440" tIns="45720" rIns="91440" bIns="45720" numCol="1" anchor="t" anchorCtr="0" compatLnSpc="1">
-            <a:prstTxWarp prst="textNoShape">
-              <a:avLst/>
-            </a:prstTxWarp>
-          </a:bodyPr>
-          <a:lstStyle/>
-          <a:p>
-            <a:pPr marL="742950" indent="-742950">
-              <a:buFont typeface="+mj-lt"/>
-              <a:buAutoNum type="arabicPeriod" startAt="7"/>
-            </a:pPr>
-            <a:r>
-              <a:rPr lang="en-US" dirty="0" smtClean="0">
-                <a:latin typeface="Comic Sans MS"/>
-                <a:cs typeface="Comic Sans MS"/>
-              </a:rPr>
-              <a:t>May 28</a:t>
-            </a:r>
-          </a:p>
-          <a:p>
-            <a:pPr marL="742950" indent="-742950">
-              <a:buFont typeface="+mj-lt"/>
-              <a:buAutoNum type="arabicPeriod" startAt="7"/>
-            </a:pPr>
-            <a:r>
-              <a:rPr lang="en-US" dirty="0" smtClean="0">
-                <a:latin typeface="Comic Sans MS"/>
-                <a:cs typeface="Comic Sans MS"/>
-              </a:rPr>
-              <a:t>Jul 23</a:t>
-            </a:r>
-          </a:p>
-          <a:p>
-            <a:pPr marL="742950" indent="-742950">
-              <a:buFont typeface="+mj-lt"/>
-              <a:buAutoNum type="arabicPeriod" startAt="7"/>
-            </a:pPr>
-            <a:r>
-              <a:rPr lang="en-US" dirty="0" smtClean="0">
-                <a:latin typeface="Comic Sans MS"/>
-                <a:cs typeface="Comic Sans MS"/>
-              </a:rPr>
-              <a:t>Sep 19</a:t>
-            </a:r>
-          </a:p>
-          <a:p>
-            <a:pPr marL="742950" indent="-742950">
-              <a:buFont typeface="+mj-lt"/>
-              <a:buAutoNum type="arabicPeriod" startAt="7"/>
-            </a:pPr>
-            <a:r>
-              <a:rPr lang="en-US" dirty="0" smtClean="0">
-                <a:latin typeface="Comic Sans MS"/>
-                <a:cs typeface="Comic Sans MS"/>
-              </a:rPr>
-              <a:t>Oct 22</a:t>
-            </a:r>
-          </a:p>
-          <a:p>
-            <a:pPr marL="742950" indent="-742950">
-              <a:buFont typeface="+mj-lt"/>
-              <a:buAutoNum type="arabicPeriod" startAt="7"/>
-            </a:pPr>
-            <a:r>
-              <a:rPr lang="en-US" dirty="0" smtClean="0">
-                <a:latin typeface="Comic Sans MS"/>
-                <a:cs typeface="Comic Sans MS"/>
-              </a:rPr>
-              <a:t>Nov 02</a:t>
-            </a:r>
-          </a:p>
-          <a:p>
-            <a:pPr marL="742950" indent="-742950">
-              <a:buFont typeface="+mj-lt"/>
-              <a:buAutoNum type="arabicPeriod" startAt="7"/>
-            </a:pPr>
-            <a:r>
-              <a:rPr lang="en-US" dirty="0" smtClean="0">
-                <a:latin typeface="Comic Sans MS"/>
-                <a:cs typeface="Comic Sans MS"/>
-              </a:rPr>
-              <a:t>Nov 13</a:t>
-            </a:r>
-          </a:p>
-          <a:p>
-            <a:pPr marL="742950" indent="-742950">
-              <a:buFont typeface="+mj-lt"/>
-              <a:buAutoNum type="arabicPeriod" startAt="7"/>
-            </a:pPr>
-            <a:r>
-              <a:rPr lang="en-US" dirty="0" smtClean="0">
-                <a:latin typeface="Comic Sans MS"/>
-                <a:cs typeface="Comic Sans MS"/>
-              </a:rPr>
-              <a:t>Nov 18</a:t>
-            </a:r>
-          </a:p>
-        </p:txBody>
-      </p:sp>
-    </p:spTree>
-  </p:cSld>
-  <p:clrMapOvr>
-    <a:masterClrMapping/>
-  </p:clrMapOvr>
-  <p:transition xmlns:p14="http://schemas.microsoft.com/office/powerpoint/2010/main" spd="slow">
-    <p:fade thruBlk="1"/>
-  </p:transition>
-  <p:timing>
-    <p:tnLst>
-      <p:par>
-        <p:cTn xmlns:p14="http://schemas.microsoft.com/office/powerpoint/2010/main" id="1" dur="indefinite" restart="never" nodeType="tmRoot"/>
-      </p:par>
-    </p:tnLst>
-  </p:timing>
-</p:sld>
-</file>
-
-<file path=ppt/slides/slide13.xml><?xml version="1.0" encoding="utf-8"?>
-<p:sld xmlns:a="http://schemas.openxmlformats.org/drawingml/2006/main" xmlns:r="http://schemas.openxmlformats.org/officeDocument/2006/relationships" xmlns:p="http://schemas.openxmlformats.org/presentationml/2006/main" show="0">
-  <p:cSld>
-    <p:spTree>
-      <p:nvGrpSpPr>
-        <p:cNvPr id="1" name=""/>
-        <p:cNvGrpSpPr/>
-        <p:nvPr/>
-      </p:nvGrpSpPr>
-      <p:grpSpPr>
-        <a:xfrm>
-          <a:off x="0" y="0"/>
-          <a:ext cx="0" cy="0"/>
-          <a:chOff x="0" y="0"/>
-          <a:chExt cx="0" cy="0"/>
-        </a:xfrm>
-      </p:grpSpPr>
-      <p:sp>
-        <p:nvSpPr>
-          <p:cNvPr id="2" name="Title 1"/>
-          <p:cNvSpPr>
-            <a:spLocks noGrp="1"/>
-          </p:cNvSpPr>
-          <p:nvPr>
-            <p:ph type="title"/>
-          </p:nvPr>
-        </p:nvSpPr>
-        <p:spPr/>
-        <p:txBody>
-          <a:bodyPr/>
-          <a:lstStyle/>
-          <a:p>
-            <a:r>
-              <a:rPr lang="en-US" dirty="0" smtClean="0"/>
               <a:t>Fall ’11 Matching Birthdays </a:t>
             </a:r>
             <a:endParaRPr lang="en-US" dirty="0"/>
@@ -5839,7 +5495,7 @@
   <p:clrMapOvr>
     <a:masterClrMapping/>
   </p:clrMapOvr>
-  <p:transition xmlns:p14="http://schemas.microsoft.com/office/powerpoint/2010/main" spd="slow" advTm="25420">
+  <p:transition xmlns:p14="http://schemas.microsoft.com/office/powerpoint/2010/main" spd="slow" advClick="0">
     <p:fade/>
   </p:transition>
   <p:timing>
@@ -5852,7 +5508,7 @@
 </p:sld>
 </file>
 
-<file path=ppt/slides/slide14.xml><?xml version="1.0" encoding="utf-8"?>
+<file path=ppt/slides/slide12.xml><?xml version="1.0" encoding="utf-8"?>
 <p:sld xmlns:a="http://schemas.openxmlformats.org/drawingml/2006/main" xmlns:r="http://schemas.openxmlformats.org/officeDocument/2006/relationships" xmlns:p="http://schemas.openxmlformats.org/presentationml/2006/main">
   <p:cSld>
     <p:spTree>
@@ -5897,7 +5553,6 @@
               <a:rPr lang="en-US" dirty="0"/>
               <a:t>' Matching Birthdays    </a:t>
             </a:r>
-            <a:endParaRPr lang="en-US" dirty="0"/>
           </a:p>
         </p:txBody>
       </p:sp>
@@ -5913,7 +5568,7 @@
         </p:nvSpPr>
         <p:spPr>
           <a:xfrm>
-            <a:off x="893763" y="927100"/>
+            <a:off x="957263" y="927100"/>
             <a:ext cx="7170737" cy="5067300"/>
           </a:xfrm>
         </p:spPr>
@@ -5946,35 +5601,14 @@
                 <a:latin typeface="Courier New"/>
                 <a:cs typeface="Courier New"/>
               </a:rPr>
-              <a:t/>
-            </a:r>
-            <a:r>
-              <a:rPr lang="en-US" sz="4400" b="1" baseline="-25000" dirty="0" smtClean="0">
-                <a:latin typeface="Courier New"/>
-                <a:cs typeface="Courier New"/>
-              </a:rPr>
-              <a:t> </a:t>
-            </a:r>
-            <a:r>
-              <a:rPr lang="en-US" sz="4400" b="1" dirty="0" smtClean="0">
-                <a:latin typeface="Courier New"/>
-                <a:cs typeface="Courier New"/>
-              </a:rPr>
-              <a:t> 5</a:t>
+              <a:t>  5</a:t>
             </a:r>
             <a:r>
               <a:rPr lang="en-US" sz="4400" b="1" dirty="0">
                 <a:latin typeface="Courier New"/>
                 <a:cs typeface="Courier New"/>
               </a:rPr>
-              <a:t>/8    </a:t>
-            </a:r>
-            <a:r>
-              <a:rPr lang="en-US" sz="4400" b="1" baseline="-25000" dirty="0">
-                <a:latin typeface="Courier New"/>
-                <a:cs typeface="Courier New"/>
-              </a:rPr>
-              <a:t> </a:t>
+              <a:t>/8     </a:t>
             </a:r>
             <a:r>
               <a:rPr lang="en-US" sz="4400" b="1" dirty="0" smtClean="0">
@@ -6335,7 +5969,7 @@
     <a:masterClrMapping/>
   </p:clrMapOvr>
   <p:transition xmlns:p14="http://schemas.microsoft.com/office/powerpoint/2010/main" spd="slow" advClick="0">
-    <p:fade thruBlk="1"/>
+    <p:fade/>
   </p:transition>
   <p:timing>
     <p:tnLst>
@@ -6692,7 +6326,7 @@
           <a:graphicData uri="http://schemas.openxmlformats.org/presentationml/2006/ole">
             <mc:AlternateContent xmlns:mc="http://schemas.openxmlformats.org/markup-compatibility/2006">
               <mc:Choice xmlns:v="urn:schemas-microsoft-com:vml" Requires="v">
-                <p:oleObj spid="_x0000_s578635" name="Equation" r:id="rId6" imgW="762000" imgH="381000" progId="Equation.DSMT4">
+                <p:oleObj spid="_x0000_s578640" name="Equation" r:id="rId6" imgW="762000" imgH="381000" progId="Equation.DSMT4">
                   <p:embed/>
                 </p:oleObj>
               </mc:Choice>
@@ -6879,7 +6513,7 @@
   <p:clrMapOvr>
     <a:masterClrMapping/>
   </p:clrMapOvr>
-  <p:transition xmlns:p14="http://schemas.microsoft.com/office/powerpoint/2010/main" spd="slow" advTm="89561">
+  <p:transition xmlns:p14="http://schemas.microsoft.com/office/powerpoint/2010/main" spd="slow" advClick="0">
     <p:fade thruBlk="1"/>
   </p:transition>
   <p:timing>
@@ -7246,7 +6880,7 @@
           <a:graphicData uri="http://schemas.openxmlformats.org/presentationml/2006/ole">
             <mc:AlternateContent xmlns:mc="http://schemas.openxmlformats.org/markup-compatibility/2006">
               <mc:Choice xmlns:v="urn:schemas-microsoft-com:vml" Requires="v">
-                <p:oleObj spid="_x0000_s580679" name="Equation" r:id="rId5" imgW="1752600" imgH="482600" progId="Equation.DSMT4">
+                <p:oleObj spid="_x0000_s580684" name="Equation" r:id="rId5" imgW="1752600" imgH="482600" progId="Equation.DSMT4">
                   <p:embed/>
                 </p:oleObj>
               </mc:Choice>
@@ -7424,18 +7058,9 @@
   <p:clrMapOvr>
     <a:masterClrMapping/>
   </p:clrMapOvr>
-  <mc:AlternateContent xmlns:mc="http://schemas.openxmlformats.org/markup-compatibility/2006" xmlns:p14="http://schemas.microsoft.com/office/powerpoint/2010/main">
-    <mc:Choice Requires="p14">
-      <p:transition spd="med" p14:dur="700" advTm="59443">
-        <p:fade/>
-      </p:transition>
-    </mc:Choice>
-    <mc:Fallback xmlns="">
-      <p:transition xmlns:p14="http://schemas.microsoft.com/office/powerpoint/2010/main" spd="med" advTm="59443">
-        <p:fade/>
-      </p:transition>
-    </mc:Fallback>
-  </mc:AlternateContent>
+  <p:transition xmlns:p14="http://schemas.microsoft.com/office/powerpoint/2010/main" spd="slow" advClick="0">
+    <p:fade/>
+  </p:transition>
   <p:timing>
     <p:tnLst>
       <p:par>
@@ -13187,18 +12812,9 @@
   <p:clrMapOvr>
     <a:masterClrMapping/>
   </p:clrMapOvr>
-  <mc:AlternateContent xmlns:mc="http://schemas.openxmlformats.org/markup-compatibility/2006">
-    <mc:Choice xmlns:p14="http://schemas.microsoft.com/office/powerpoint/2010/main" Requires="p14">
-      <p:transition spd="med" p14:dur="700" advTm="49816">
-        <p:fade/>
-      </p:transition>
-    </mc:Choice>
-    <mc:Fallback>
-      <p:transition xmlns:p14="http://schemas.microsoft.com/office/powerpoint/2010/main" spd="med" advTm="49816">
-        <p:fade/>
-      </p:transition>
-    </mc:Fallback>
-  </mc:AlternateContent>
+  <p:transition xmlns:p14="http://schemas.microsoft.com/office/powerpoint/2010/main" spd="slow" advClick="0">
+    <p:fade/>
+  </p:transition>
   <p:timing>
     <p:tnLst>
       <p:par>
@@ -13363,25 +12979,25 @@
             <p:ph sz="half" idx="2"/>
             <p:extLst>
               <p:ext uri="{D42A27DB-BD31-4B8C-83A1-F6EECF244321}">
-                <p14:modId xmlns:p14="http://schemas.microsoft.com/office/powerpoint/2010/main" val="3396804093"/>
+                <p14:modId xmlns:p14="http://schemas.microsoft.com/office/powerpoint/2010/main" val="3938499671"/>
               </p:ext>
             </p:extLst>
           </p:nvPr>
         </p:nvGraphicFramePr>
         <p:xfrm>
-          <a:off x="1304925" y="2085975"/>
-          <a:ext cx="6505575" cy="1728788"/>
+          <a:off x="1417638" y="2085975"/>
+          <a:ext cx="6278562" cy="1728788"/>
         </p:xfrm>
         <a:graphic>
           <a:graphicData uri="http://schemas.openxmlformats.org/presentationml/2006/ole">
             <mc:AlternateContent xmlns:mc="http://schemas.openxmlformats.org/markup-compatibility/2006">
               <mc:Choice xmlns:v="urn:schemas-microsoft-com:vml" Requires="v">
-                <p:oleObj spid="_x0000_s582727" name="Equation" r:id="rId5" imgW="1816100" imgH="482600" progId="Equation.DSMT4">
+                <p:oleObj spid="_x0000_s582733" name="Equation" r:id="rId5" imgW="1752600" imgH="482600" progId="Equation.DSMT4">
                   <p:embed/>
                 </p:oleObj>
               </mc:Choice>
               <mc:Fallback>
-                <p:oleObj name="Equation" r:id="rId5" imgW="1816100" imgH="482600" progId="Equation.DSMT4">
+                <p:oleObj name="Equation" r:id="rId5" imgW="1752600" imgH="482600" progId="Equation.DSMT4">
                   <p:embed/>
                   <p:pic>
                     <p:nvPicPr>
@@ -13400,8 +13016,8 @@
                     </p:blipFill>
                     <p:spPr bwMode="auto">
                       <a:xfrm>
-                        <a:off x="1304925" y="2085975"/>
-                        <a:ext cx="6505575" cy="1728788"/>
+                        <a:off x="1417638" y="2085975"/>
+                        <a:ext cx="6278562" cy="1728788"/>
                       </a:xfrm>
                       <a:prstGeom prst="rect">
                         <a:avLst/>
@@ -13447,7 +13063,7 @@
         <p:spPr bwMode="auto">
           <a:xfrm>
             <a:off x="554038" y="1104124"/>
-            <a:ext cx="7919956" cy="830997"/>
+            <a:ext cx="7722787" cy="830997"/>
           </a:xfrm>
           <a:prstGeom prst="rect">
             <a:avLst/>
@@ -13481,7 +13097,13 @@
               <a:rPr lang="en-US" sz="4800" dirty="0" smtClean="0">
                 <a:latin typeface="Comic Sans MS" charset="0"/>
               </a:rPr>
-              <a:t> 206 </a:t>
+              <a:t> </a:t>
+            </a:r>
+            <a:r>
+              <a:rPr lang="en-US" sz="4800" dirty="0" smtClean="0">
+                <a:latin typeface="Comic Sans MS" charset="0"/>
+              </a:rPr>
+              <a:t>110 </a:t>
             </a:r>
             <a:r>
               <a:rPr lang="en-US" sz="4800" dirty="0">
@@ -13527,18 +13149,9 @@
   <p:clrMapOvr>
     <a:masterClrMapping/>
   </p:clrMapOvr>
-  <mc:AlternateContent xmlns:mc="http://schemas.openxmlformats.org/markup-compatibility/2006" xmlns:p14="http://schemas.microsoft.com/office/powerpoint/2010/main">
-    <mc:Choice Requires="p14">
-      <p:transition spd="med" p14:dur="700" advTm="50760">
-        <p:fade/>
-      </p:transition>
-    </mc:Choice>
-    <mc:Fallback xmlns="">
-      <p:transition xmlns:p14="http://schemas.microsoft.com/office/powerpoint/2010/main" spd="med" advTm="50760">
-        <p:fade/>
-      </p:transition>
-    </mc:Fallback>
-  </mc:AlternateContent>
+  <p:transition xmlns:p14="http://schemas.microsoft.com/office/powerpoint/2010/main" spd="slow" advClick="0">
+    <p:fade/>
+  </p:transition>
   <p:timing>
     <p:tnLst>
       <p:par>
@@ -13703,7 +13316,7 @@
                   <a:srgbClr val="0000FF"/>
                 </a:solidFill>
               </a:rPr>
-              <a:t>57.8</a:t>
+              <a:t>16.4</a:t>
             </a:r>
             <a:r>
               <a:rPr lang="en-US" sz="4800" dirty="0" smtClean="0"/>
@@ -13749,7 +13362,7 @@
                   <a:srgbClr val="0000FF"/>
                 </a:solidFill>
               </a:rPr>
-              <a:t>57.8| </a:t>
+              <a:t>16.4| </a:t>
             </a:r>
             <a:r>
               <a:rPr lang="en-US" sz="4800" b="1" dirty="0" smtClean="0">
@@ -13855,18 +13468,9 @@
   <p:clrMapOvr>
     <a:masterClrMapping/>
   </p:clrMapOvr>
-  <mc:AlternateContent xmlns:mc="http://schemas.openxmlformats.org/markup-compatibility/2006" xmlns:p14="http://schemas.microsoft.com/office/powerpoint/2010/main">
-    <mc:Choice Requires="p14">
-      <p:transition spd="med" p14:dur="700" advTm="33576">
-        <p:fade/>
-      </p:transition>
-    </mc:Choice>
-    <mc:Fallback xmlns="">
-      <p:transition xmlns:p14="http://schemas.microsoft.com/office/powerpoint/2010/main" spd="med" advTm="33576">
-        <p:fade/>
-      </p:transition>
-    </mc:Fallback>
-  </mc:AlternateContent>
+  <p:transition xmlns:p14="http://schemas.microsoft.com/office/powerpoint/2010/main" spd="slow" advClick="0">
+    <p:fade/>
+  </p:transition>
   <p:timing>
     <p:tnLst>
       <p:par>
@@ -14506,18 +14110,9 @@
   <p:clrMapOvr>
     <a:masterClrMapping/>
   </p:clrMapOvr>
-  <mc:AlternateContent xmlns:mc="http://schemas.openxmlformats.org/markup-compatibility/2006" xmlns:p14="http://schemas.microsoft.com/office/powerpoint/2010/main">
-    <mc:Choice Requires="p14">
-      <p:transition spd="med" p14:dur="700" advTm="80422">
-        <p:fade/>
-      </p:transition>
-    </mc:Choice>
-    <mc:Fallback xmlns="">
-      <p:transition xmlns:p14="http://schemas.microsoft.com/office/powerpoint/2010/main" spd="med" advTm="80422">
-        <p:fade/>
-      </p:transition>
-    </mc:Fallback>
-  </mc:AlternateContent>
+  <p:transition xmlns:p14="http://schemas.microsoft.com/office/powerpoint/2010/main" spd="slow" advClick="0">
+    <p:fade/>
+  </p:transition>
   <p:timing>
     <p:tnLst>
       <p:par>
@@ -15326,18 +14921,9 @@
   <p:clrMapOvr>
     <a:masterClrMapping/>
   </p:clrMapOvr>
-  <mc:AlternateContent xmlns:mc="http://schemas.openxmlformats.org/markup-compatibility/2006" xmlns:p14="http://schemas.microsoft.com/office/powerpoint/2010/main">
-    <mc:Choice Requires="p14">
-      <p:transition spd="med" p14:dur="700" advTm="84493">
-        <p:fade/>
-      </p:transition>
-    </mc:Choice>
-    <mc:Fallback xmlns="">
-      <p:transition xmlns:p14="http://schemas.microsoft.com/office/powerpoint/2010/main" spd="med" advTm="84493">
-        <p:fade/>
-      </p:transition>
-    </mc:Fallback>
-  </mc:AlternateContent>
+  <p:transition xmlns:p14="http://schemas.microsoft.com/office/powerpoint/2010/main" spd="slow" advClick="0">
+    <p:fade/>
+  </p:transition>
   <p:timing>
     <p:tnLst>
       <p:par>
@@ -15881,25 +15467,25 @@
           <p:nvPr>
             <p:extLst>
               <p:ext uri="{D42A27DB-BD31-4B8C-83A1-F6EECF244321}">
-                <p14:modId xmlns:p14="http://schemas.microsoft.com/office/powerpoint/2010/main" val="2148057350"/>
+                <p14:modId xmlns:p14="http://schemas.microsoft.com/office/powerpoint/2010/main" val="2306743736"/>
               </p:ext>
             </p:extLst>
           </p:nvPr>
         </p:nvGraphicFramePr>
         <p:xfrm>
-          <a:off x="822827" y="4108450"/>
-          <a:ext cx="7507872" cy="1593850"/>
+          <a:off x="801688" y="4108450"/>
+          <a:ext cx="7550150" cy="1593850"/>
         </p:xfrm>
         <a:graphic>
           <a:graphicData uri="http://schemas.openxmlformats.org/presentationml/2006/ole">
             <mc:AlternateContent xmlns:mc="http://schemas.openxmlformats.org/markup-compatibility/2006">
               <mc:Choice xmlns:v="urn:schemas-microsoft-com:vml" Requires="v">
-                <p:oleObj spid="_x0000_s585872" name="Equation" r:id="rId5" imgW="2273300" imgH="482600" progId="Equation.DSMT4">
+                <p:oleObj spid="_x0000_s585891" name="Equation" r:id="rId5" imgW="2286000" imgH="482600" progId="Equation.DSMT4">
                   <p:embed/>
                 </p:oleObj>
               </mc:Choice>
               <mc:Fallback>
-                <p:oleObj name="Equation" r:id="rId5" imgW="2273300" imgH="482600" progId="Equation.DSMT4">
+                <p:oleObj name="Equation" r:id="rId5" imgW="2286000" imgH="482600" progId="Equation.DSMT4">
                   <p:embed/>
                   <p:pic>
                     <p:nvPicPr>
@@ -15915,8 +15501,8 @@
                     </p:blipFill>
                     <p:spPr>
                       <a:xfrm>
-                        <a:off x="822827" y="4108450"/>
-                        <a:ext cx="7507872" cy="1593850"/>
+                        <a:off x="801688" y="4108450"/>
+                        <a:ext cx="7550150" cy="1593850"/>
                       </a:xfrm>
                       <a:prstGeom prst="rect">
                         <a:avLst/>
@@ -15938,25 +15524,25 @@
           <p:nvPr>
             <p:extLst>
               <p:ext uri="{D42A27DB-BD31-4B8C-83A1-F6EECF244321}">
-                <p14:modId xmlns:p14="http://schemas.microsoft.com/office/powerpoint/2010/main" val="1696747167"/>
+                <p14:modId xmlns:p14="http://schemas.microsoft.com/office/powerpoint/2010/main" val="1322045820"/>
               </p:ext>
             </p:extLst>
           </p:nvPr>
         </p:nvGraphicFramePr>
         <p:xfrm>
-          <a:off x="3289300" y="5449888"/>
-          <a:ext cx="2574925" cy="1087437"/>
+          <a:off x="3460750" y="5449888"/>
+          <a:ext cx="2230438" cy="1087437"/>
         </p:xfrm>
         <a:graphic>
           <a:graphicData uri="http://schemas.openxmlformats.org/presentationml/2006/ole">
             <mc:AlternateContent xmlns:mc="http://schemas.openxmlformats.org/markup-compatibility/2006">
               <mc:Choice xmlns:v="urn:schemas-microsoft-com:vml" Requires="v">
-                <p:oleObj spid="_x0000_s585873" name="Equation" r:id="rId7" imgW="571500" imgH="241300" progId="Equation.DSMT4">
+                <p:oleObj spid="_x0000_s585892" name="Equation" r:id="rId7" imgW="495300" imgH="241300" progId="Equation.DSMT4">
                   <p:embed/>
                 </p:oleObj>
               </mc:Choice>
               <mc:Fallback>
-                <p:oleObj name="Equation" r:id="rId7" imgW="571500" imgH="241300" progId="Equation.DSMT4">
+                <p:oleObj name="Equation" r:id="rId7" imgW="495300" imgH="241300" progId="Equation.DSMT4">
                   <p:embed/>
                   <p:pic>
                     <p:nvPicPr>
@@ -15975,8 +15561,8 @@
                     </p:blipFill>
                     <p:spPr bwMode="auto">
                       <a:xfrm>
-                        <a:off x="3289300" y="5449888"/>
-                        <a:ext cx="2574925" cy="1087437"/>
+                        <a:off x="3460750" y="5449888"/>
+                        <a:ext cx="2230438" cy="1087437"/>
                       </a:xfrm>
                       <a:prstGeom prst="rect">
                         <a:avLst/>
@@ -16020,25 +15606,25 @@
           <p:nvPr>
             <p:extLst>
               <p:ext uri="{D42A27DB-BD31-4B8C-83A1-F6EECF244321}">
-                <p14:modId xmlns:p14="http://schemas.microsoft.com/office/powerpoint/2010/main" val="375506740"/>
+                <p14:modId xmlns:p14="http://schemas.microsoft.com/office/powerpoint/2010/main" val="3606120656"/>
               </p:ext>
             </p:extLst>
           </p:nvPr>
         </p:nvGraphicFramePr>
         <p:xfrm>
-          <a:off x="431299" y="2509838"/>
-          <a:ext cx="8235989" cy="1604962"/>
+          <a:off x="515938" y="2509838"/>
+          <a:ext cx="8067675" cy="1604962"/>
         </p:xfrm>
         <a:graphic>
           <a:graphicData uri="http://schemas.openxmlformats.org/presentationml/2006/ole">
             <mc:AlternateContent xmlns:mc="http://schemas.openxmlformats.org/markup-compatibility/2006">
               <mc:Choice xmlns:v="urn:schemas-microsoft-com:vml" Requires="v">
-                <p:oleObj spid="_x0000_s585874" name="Equation" r:id="rId9" imgW="2476500" imgH="482600" progId="Equation.DSMT4">
+                <p:oleObj spid="_x0000_s585893" name="Equation" r:id="rId9" imgW="2425700" imgH="482600" progId="Equation.DSMT4">
                   <p:embed/>
                 </p:oleObj>
               </mc:Choice>
               <mc:Fallback>
-                <p:oleObj name="Equation" r:id="rId9" imgW="2476500" imgH="482600" progId="Equation.DSMT4">
+                <p:oleObj name="Equation" r:id="rId9" imgW="2425700" imgH="482600" progId="Equation.DSMT4">
                   <p:embed/>
                   <p:pic>
                     <p:nvPicPr>
@@ -16054,8 +15640,8 @@
                     </p:blipFill>
                     <p:spPr>
                       <a:xfrm>
-                        <a:off x="431299" y="2509838"/>
-                        <a:ext cx="8235989" cy="1604962"/>
+                        <a:off x="515938" y="2509838"/>
+                        <a:ext cx="8067675" cy="1604962"/>
                       </a:xfrm>
                       <a:prstGeom prst="rect">
                         <a:avLst/>
@@ -16103,18 +15689,9 @@
   <p:clrMapOvr>
     <a:masterClrMapping/>
   </p:clrMapOvr>
-  <mc:AlternateContent xmlns:mc="http://schemas.openxmlformats.org/markup-compatibility/2006" xmlns:p14="http://schemas.microsoft.com/office/powerpoint/2010/main">
-    <mc:Choice Requires="p14">
-      <p:transition spd="med" p14:dur="700" advTm="68935">
-        <p:fade/>
-      </p:transition>
-    </mc:Choice>
-    <mc:Fallback xmlns="">
-      <p:transition xmlns:p14="http://schemas.microsoft.com/office/powerpoint/2010/main" spd="med" advTm="68935">
-        <p:fade/>
-      </p:transition>
-    </mc:Fallback>
-  </mc:AlternateContent>
+  <p:transition xmlns:p14="http://schemas.microsoft.com/office/powerpoint/2010/main" spd="slow" advClick="0">
+    <p:fade/>
+  </p:transition>
   <p:timing>
     <p:tnLst>
       <p:par>

</xml_diff>